<commit_message>
added 1h heatmap and DEG table to poster
</commit_message>
<xml_diff>
--- a/poster.pptx
+++ b/poster.pptx
@@ -1598,52 +1598,120 @@
           <a:chExt cx="0" cy="0"/>
         </a:xfrm>
       </p:grpSpPr>
-      <p:pic>
-        <p:nvPicPr>
-          <p:cNvPr id="20" name="D36E_system.png" descr="D36E_system.png"/>
-          <p:cNvPicPr>
-            <a:picLocks noChangeAspect="1"/>
-          </p:cNvPicPr>
-          <p:nvPr/>
-        </p:nvPicPr>
-        <p:blipFill>
-          <a:blip r:embed="rId2">
-            <a:extLst/>
-          </a:blip>
-          <a:srcRect l="3285" t="2605" r="0" b="0"/>
-          <a:stretch>
-            <a:fillRect/>
-          </a:stretch>
-        </p:blipFill>
-        <p:spPr>
-          <a:xfrm>
-            <a:off x="469949" y="15466020"/>
-            <a:ext cx="10870819" cy="5072560"/>
-          </a:xfrm>
-          <a:prstGeom prst="rect">
-            <a:avLst/>
-          </a:prstGeom>
-          <a:ln w="12700">
-            <a:miter lim="400000"/>
-          </a:ln>
-        </p:spPr>
-      </p:pic>
       <p:sp>
         <p:nvSpPr>
-          <p:cNvPr id="21" name="Rectangle"/>
+          <p:cNvPr id="20" name="Shape"/>
           <p:cNvSpPr/>
           <p:nvPr/>
         </p:nvSpPr>
         <p:spPr>
-          <a:xfrm>
-            <a:off x="469900" y="15147289"/>
-            <a:ext cx="3248819" cy="1270001"/>
+          <a:xfrm flipH="1" rot="5400000">
+            <a:off x="9019913" y="30715263"/>
+            <a:ext cx="2236720" cy="4143501"/>
           </a:xfrm>
-          <a:prstGeom prst="rect">
+          <a:custGeom>
             <a:avLst/>
-          </a:prstGeom>
+            <a:gdLst/>
+            <a:ahLst/>
+            <a:cxnLst>
+              <a:cxn ang="0">
+                <a:pos x="wd2" y="hd2"/>
+              </a:cxn>
+              <a:cxn ang="5400000">
+                <a:pos x="wd2" y="hd2"/>
+              </a:cxn>
+              <a:cxn ang="10800000">
+                <a:pos x="wd2" y="hd2"/>
+              </a:cxn>
+              <a:cxn ang="16200000">
+                <a:pos x="wd2" y="hd2"/>
+              </a:cxn>
+            </a:cxnLst>
+            <a:rect l="0" t="0" r="r" b="b"/>
+            <a:pathLst>
+              <a:path w="21505" h="21600" fill="norm" stroke="1" extrusionOk="0">
+                <a:moveTo>
+                  <a:pt x="13049" y="0"/>
+                </a:moveTo>
+                <a:cubicBezTo>
+                  <a:pt x="7711" y="0"/>
+                  <a:pt x="3007" y="2124"/>
+                  <a:pt x="3104" y="4928"/>
+                </a:cubicBezTo>
+                <a:cubicBezTo>
+                  <a:pt x="3104" y="4938"/>
+                  <a:pt x="3105" y="4948"/>
+                  <a:pt x="3106" y="4958"/>
+                </a:cubicBezTo>
+                <a:lnTo>
+                  <a:pt x="3104" y="17359"/>
+                </a:lnTo>
+                <a:lnTo>
+                  <a:pt x="0" y="17359"/>
+                </a:lnTo>
+                <a:lnTo>
+                  <a:pt x="5760" y="21600"/>
+                </a:lnTo>
+                <a:lnTo>
+                  <a:pt x="11521" y="17359"/>
+                </a:lnTo>
+                <a:lnTo>
+                  <a:pt x="8402" y="17359"/>
+                </a:lnTo>
+                <a:lnTo>
+                  <a:pt x="8402" y="4958"/>
+                </a:lnTo>
+                <a:lnTo>
+                  <a:pt x="8402" y="4945"/>
+                </a:lnTo>
+                <a:cubicBezTo>
+                  <a:pt x="8402" y="4940"/>
+                  <a:pt x="8402" y="4934"/>
+                  <a:pt x="8402" y="4928"/>
+                </a:cubicBezTo>
+                <a:cubicBezTo>
+                  <a:pt x="8414" y="3603"/>
+                  <a:pt x="10652" y="2612"/>
+                  <a:pt x="13049" y="2872"/>
+                </a:cubicBezTo>
+                <a:lnTo>
+                  <a:pt x="13051" y="2872"/>
+                </a:lnTo>
+                <a:cubicBezTo>
+                  <a:pt x="14479" y="3306"/>
+                  <a:pt x="15303" y="4080"/>
+                  <a:pt x="15864" y="4928"/>
+                </a:cubicBezTo>
+                <a:cubicBezTo>
+                  <a:pt x="16546" y="5956"/>
+                  <a:pt x="16989" y="11385"/>
+                  <a:pt x="16094" y="12400"/>
+                </a:cubicBezTo>
+                <a:lnTo>
+                  <a:pt x="21396" y="12400"/>
+                </a:lnTo>
+                <a:cubicBezTo>
+                  <a:pt x="21600" y="12131"/>
+                  <a:pt x="21465" y="5214"/>
+                  <a:pt x="21405" y="4928"/>
+                </a:cubicBezTo>
+                <a:cubicBezTo>
+                  <a:pt x="20890" y="2463"/>
+                  <a:pt x="17624" y="441"/>
+                  <a:pt x="13134" y="0"/>
+                </a:cubicBezTo>
+                <a:lnTo>
+                  <a:pt x="13051" y="0"/>
+                </a:lnTo>
+                <a:lnTo>
+                  <a:pt x="13049" y="0"/>
+                </a:lnTo>
+                <a:close/>
+              </a:path>
+            </a:pathLst>
+          </a:custGeom>
           <a:solidFill>
-            <a:srgbClr val="FFFFFF"/>
+            <a:srgbClr val="000000"/>
           </a:solidFill>
           <a:ln w="12700">
             <a:miter lim="400000"/>
@@ -1657,27 +1725,16 @@
           </a:p>
         </p:txBody>
       </p:sp>
-      <p:pic>
-        <p:nvPicPr>
-          <p:cNvPr id="22" name="cluster_specific_enrichment_heatmap.png" descr="cluster_specific_enrichment_heatmap.png"/>
-          <p:cNvPicPr>
-            <a:picLocks noChangeAspect="1"/>
-          </p:cNvPicPr>
+      <p:sp>
+        <p:nvSpPr>
+          <p:cNvPr id="21" name="Deseq2"/>
+          <p:cNvSpPr txBox="1"/>
           <p:nvPr/>
-        </p:nvPicPr>
-        <p:blipFill>
-          <a:blip r:embed="rId3">
-            <a:extLst/>
-          </a:blip>
-          <a:srcRect l="17093" t="12159" r="22712" b="13129"/>
-          <a:stretch>
-            <a:fillRect/>
-          </a:stretch>
-        </p:blipFill>
+        </p:nvSpPr>
         <p:spPr>
           <a:xfrm>
-            <a:off x="11083131" y="6394449"/>
-            <a:ext cx="17432184" cy="28848212"/>
+            <a:off x="8708242" y="32964294"/>
+            <a:ext cx="2289440" cy="698501"/>
           </a:xfrm>
           <a:prstGeom prst="rect">
             <a:avLst/>
@@ -1685,18 +1742,507 @@
           <a:ln w="12700">
             <a:miter lim="400000"/>
           </a:ln>
+          <a:extLst>
+            <a:ext uri="{C572A759-6A51-4108-AA02-DFA0A04FC94B}">
+              <ma14:wrappingTextBoxFlag xmlns:ma14="http://schemas.microsoft.com/office/mac/drawingml/2011/main" val="1"/>
+            </a:ext>
+          </a:extLst>
         </p:spPr>
-      </p:pic>
+        <p:txBody>
+          <a:bodyPr lIns="50800" tIns="50800" rIns="50800" bIns="50800" anchor="ctr">
+            <a:spAutoFit/>
+          </a:bodyPr>
+          <a:lstStyle>
+            <a:lvl1pPr algn="ctr">
+              <a:defRPr sz="3900">
+                <a:solidFill>
+                  <a:srgbClr val="FFFFFF"/>
+                </a:solidFill>
+              </a:defRPr>
+            </a:lvl1pPr>
+          </a:lstStyle>
+          <a:p>
+            <a:pPr/>
+            <a:r>
+              <a:t>Deseq2</a:t>
+            </a:r>
+          </a:p>
+        </p:txBody>
+      </p:sp>
       <p:sp>
         <p:nvSpPr>
-          <p:cNvPr id="23" name="Shape 20"/>
+          <p:cNvPr id="22" name=".csv count files"/>
           <p:cNvSpPr txBox="1"/>
           <p:nvPr/>
         </p:nvSpPr>
         <p:spPr>
           <a:xfrm>
-            <a:off x="1164461" y="5262157"/>
-            <a:ext cx="9591920" cy="11195201"/>
+            <a:off x="7843679" y="31564679"/>
+            <a:ext cx="3516388" cy="800101"/>
+          </a:xfrm>
+          <a:prstGeom prst="rect">
+            <a:avLst/>
+          </a:prstGeom>
+          <a:solidFill>
+            <a:srgbClr val="FFFFFF"/>
+          </a:solidFill>
+          <a:ln w="25400">
+            <a:solidFill>
+              <a:srgbClr val="000000"/>
+            </a:solidFill>
+            <a:miter lim="400000"/>
+          </a:ln>
+          <a:extLst>
+            <a:ext uri="{C572A759-6A51-4108-AA02-DFA0A04FC94B}">
+              <ma14:wrappingTextBoxFlag xmlns:ma14="http://schemas.microsoft.com/office/mac/drawingml/2011/main" val="1"/>
+            </a:ext>
+          </a:extLst>
+        </p:spPr>
+        <p:txBody>
+          <a:bodyPr lIns="114300" tIns="114300" rIns="114300" bIns="114300" anchor="ctr">
+            <a:spAutoFit/>
+          </a:bodyPr>
+          <a:lstStyle>
+            <a:lvl1pPr algn="ctr">
+              <a:defRPr sz="3600"/>
+            </a:lvl1pPr>
+          </a:lstStyle>
+          <a:p>
+            <a:pPr/>
+            <a:r>
+              <a:t>.csv count files</a:t>
+            </a:r>
+          </a:p>
+        </p:txBody>
+      </p:sp>
+      <p:sp>
+        <p:nvSpPr>
+          <p:cNvPr id="23" name="Shape"/>
+          <p:cNvSpPr/>
+          <p:nvPr/>
+        </p:nvSpPr>
+        <p:spPr>
+          <a:xfrm>
+            <a:off x="3195978" y="29776360"/>
+            <a:ext cx="1729880" cy="2064446"/>
+          </a:xfrm>
+          <a:custGeom>
+            <a:avLst/>
+            <a:gdLst/>
+            <a:ahLst/>
+            <a:cxnLst>
+              <a:cxn ang="0">
+                <a:pos x="wd2" y="hd2"/>
+              </a:cxn>
+              <a:cxn ang="5400000">
+                <a:pos x="wd2" y="hd2"/>
+              </a:cxn>
+              <a:cxn ang="10800000">
+                <a:pos x="wd2" y="hd2"/>
+              </a:cxn>
+              <a:cxn ang="16200000">
+                <a:pos x="wd2" y="hd2"/>
+              </a:cxn>
+            </a:cxnLst>
+            <a:rect l="0" t="0" r="r" b="b"/>
+            <a:pathLst>
+              <a:path w="21600" h="21600" fill="norm" stroke="1" extrusionOk="0">
+                <a:moveTo>
+                  <a:pt x="8495" y="0"/>
+                </a:moveTo>
+                <a:lnTo>
+                  <a:pt x="0" y="2083"/>
+                </a:lnTo>
+                <a:lnTo>
+                  <a:pt x="14619" y="20804"/>
+                </a:lnTo>
+                <a:lnTo>
+                  <a:pt x="21600" y="21600"/>
+                </a:lnTo>
+                <a:lnTo>
+                  <a:pt x="8495" y="0"/>
+                </a:lnTo>
+                <a:close/>
+              </a:path>
+            </a:pathLst>
+          </a:custGeom>
+          <a:solidFill>
+            <a:srgbClr val="000000"/>
+          </a:solidFill>
+          <a:ln w="25400">
+            <a:solidFill>
+              <a:srgbClr val="000000"/>
+            </a:solidFill>
+          </a:ln>
+        </p:spPr>
+        <p:txBody>
+          <a:bodyPr lIns="50800" tIns="50800" rIns="50800" bIns="50800" anchor="ctr"/>
+          <a:lstStyle/>
+          <a:p>
+            <a:pPr>
+              <a:defRPr sz="4600"/>
+            </a:pPr>
+          </a:p>
+        </p:txBody>
+      </p:sp>
+      <p:sp>
+        <p:nvSpPr>
+          <p:cNvPr id="24" name=".bam alignment files"/>
+          <p:cNvSpPr txBox="1"/>
+          <p:nvPr/>
+        </p:nvSpPr>
+        <p:spPr>
+          <a:xfrm>
+            <a:off x="1033714" y="29173345"/>
+            <a:ext cx="3223420" cy="1346201"/>
+          </a:xfrm>
+          <a:prstGeom prst="rect">
+            <a:avLst/>
+          </a:prstGeom>
+          <a:solidFill>
+            <a:srgbClr val="FFFFFF"/>
+          </a:solidFill>
+          <a:ln w="25400">
+            <a:solidFill>
+              <a:srgbClr val="000000"/>
+            </a:solidFill>
+            <a:miter lim="400000"/>
+          </a:ln>
+          <a:extLst>
+            <a:ext uri="{C572A759-6A51-4108-AA02-DFA0A04FC94B}">
+              <ma14:wrappingTextBoxFlag xmlns:ma14="http://schemas.microsoft.com/office/mac/drawingml/2011/main" val="1"/>
+            </a:ext>
+          </a:extLst>
+        </p:spPr>
+        <p:txBody>
+          <a:bodyPr lIns="114300" tIns="114300" rIns="114300" bIns="114300" anchor="ctr">
+            <a:spAutoFit/>
+          </a:bodyPr>
+          <a:lstStyle>
+            <a:lvl1pPr algn="ctr">
+              <a:defRPr sz="3600"/>
+            </a:lvl1pPr>
+          </a:lstStyle>
+          <a:p>
+            <a:pPr/>
+            <a:r>
+              <a:t>.bam alignment files</a:t>
+            </a:r>
+          </a:p>
+        </p:txBody>
+      </p:sp>
+      <p:sp>
+        <p:nvSpPr>
+          <p:cNvPr id="25" name="Shape"/>
+          <p:cNvSpPr/>
+          <p:nvPr/>
+        </p:nvSpPr>
+        <p:spPr>
+          <a:xfrm rot="16200000">
+            <a:off x="2389839" y="32238994"/>
+            <a:ext cx="2228341" cy="3889501"/>
+          </a:xfrm>
+          <a:custGeom>
+            <a:avLst/>
+            <a:gdLst/>
+            <a:ahLst/>
+            <a:cxnLst>
+              <a:cxn ang="0">
+                <a:pos x="wd2" y="hd2"/>
+              </a:cxn>
+              <a:cxn ang="5400000">
+                <a:pos x="wd2" y="hd2"/>
+              </a:cxn>
+              <a:cxn ang="10800000">
+                <a:pos x="wd2" y="hd2"/>
+              </a:cxn>
+              <a:cxn ang="16200000">
+                <a:pos x="wd2" y="hd2"/>
+              </a:cxn>
+            </a:cxnLst>
+            <a:rect l="0" t="0" r="r" b="b"/>
+            <a:pathLst>
+              <a:path w="21544" h="21600" fill="norm" stroke="1" extrusionOk="0">
+                <a:moveTo>
+                  <a:pt x="12140" y="0"/>
+                </a:moveTo>
+                <a:cubicBezTo>
+                  <a:pt x="7314" y="0"/>
+                  <a:pt x="2995" y="2010"/>
+                  <a:pt x="3121" y="4686"/>
+                </a:cubicBezTo>
+                <a:cubicBezTo>
+                  <a:pt x="3121" y="4696"/>
+                  <a:pt x="3122" y="4707"/>
+                  <a:pt x="3123" y="4717"/>
+                </a:cubicBezTo>
+                <a:lnTo>
+                  <a:pt x="3121" y="17082"/>
+                </a:lnTo>
+                <a:lnTo>
+                  <a:pt x="0" y="17082"/>
+                </a:lnTo>
+                <a:lnTo>
+                  <a:pt x="5793" y="21600"/>
+                </a:lnTo>
+                <a:lnTo>
+                  <a:pt x="12813" y="17082"/>
+                </a:lnTo>
+                <a:lnTo>
+                  <a:pt x="9677" y="17082"/>
+                </a:lnTo>
+                <a:lnTo>
+                  <a:pt x="9677" y="4717"/>
+                </a:lnTo>
+                <a:lnTo>
+                  <a:pt x="9677" y="4704"/>
+                </a:lnTo>
+                <a:cubicBezTo>
+                  <a:pt x="9677" y="4698"/>
+                  <a:pt x="9677" y="4692"/>
+                  <a:pt x="9677" y="4686"/>
+                </a:cubicBezTo>
+                <a:cubicBezTo>
+                  <a:pt x="9689" y="3882"/>
+                  <a:pt x="11050" y="3313"/>
+                  <a:pt x="12385" y="3553"/>
+                </a:cubicBezTo>
+                <a:lnTo>
+                  <a:pt x="12387" y="3553"/>
+                </a:lnTo>
+                <a:cubicBezTo>
+                  <a:pt x="13014" y="3488"/>
+                  <a:pt x="13661" y="3566"/>
+                  <a:pt x="14187" y="3773"/>
+                </a:cubicBezTo>
+                <a:cubicBezTo>
+                  <a:pt x="14958" y="4075"/>
+                  <a:pt x="15348" y="4588"/>
+                  <a:pt x="15585" y="5109"/>
+                </a:cubicBezTo>
+                <a:cubicBezTo>
+                  <a:pt x="16055" y="6141"/>
+                  <a:pt x="15959" y="7297"/>
+                  <a:pt x="15899" y="8439"/>
+                </a:cubicBezTo>
+                <a:cubicBezTo>
+                  <a:pt x="15820" y="9970"/>
+                  <a:pt x="15814" y="11501"/>
+                  <a:pt x="15815" y="12927"/>
+                </a:cubicBezTo>
+                <a:lnTo>
+                  <a:pt x="21515" y="12927"/>
+                </a:lnTo>
+                <a:cubicBezTo>
+                  <a:pt x="21517" y="11570"/>
+                  <a:pt x="21505" y="9935"/>
+                  <a:pt x="21531" y="8299"/>
+                </a:cubicBezTo>
+                <a:cubicBezTo>
+                  <a:pt x="21552" y="7000"/>
+                  <a:pt x="21600" y="5687"/>
+                  <a:pt x="21157" y="4686"/>
+                </a:cubicBezTo>
+                <a:cubicBezTo>
+                  <a:pt x="20068" y="2225"/>
+                  <a:pt x="16592" y="362"/>
+                  <a:pt x="12225" y="0"/>
+                </a:cubicBezTo>
+                <a:lnTo>
+                  <a:pt x="12142" y="0"/>
+                </a:lnTo>
+                <a:lnTo>
+                  <a:pt x="12140" y="0"/>
+                </a:lnTo>
+                <a:close/>
+              </a:path>
+            </a:pathLst>
+          </a:custGeom>
+          <a:solidFill>
+            <a:srgbClr val="000000"/>
+          </a:solidFill>
+          <a:ln w="12700">
+            <a:miter lim="400000"/>
+          </a:ln>
+        </p:spPr>
+        <p:txBody>
+          <a:bodyPr lIns="50800" tIns="50800" rIns="50800" bIns="50800" anchor="ctr"/>
+          <a:lstStyle/>
+          <a:p>
+            <a:pPr/>
+          </a:p>
+        </p:txBody>
+      </p:sp>
+      <p:sp>
+        <p:nvSpPr>
+          <p:cNvPr id="26" name="Enriched Genes"/>
+          <p:cNvSpPr txBox="1"/>
+          <p:nvPr/>
+        </p:nvSpPr>
+        <p:spPr>
+          <a:xfrm>
+            <a:off x="3818670" y="32913494"/>
+            <a:ext cx="4262370" cy="800101"/>
+          </a:xfrm>
+          <a:prstGeom prst="rect">
+            <a:avLst/>
+          </a:prstGeom>
+          <a:solidFill>
+            <a:srgbClr val="FFFFFF"/>
+          </a:solidFill>
+          <a:ln w="25400">
+            <a:solidFill>
+              <a:srgbClr val="000000"/>
+            </a:solidFill>
+            <a:miter lim="400000"/>
+          </a:ln>
+          <a:extLst>
+            <a:ext uri="{C572A759-6A51-4108-AA02-DFA0A04FC94B}">
+              <ma14:wrappingTextBoxFlag xmlns:ma14="http://schemas.microsoft.com/office/mac/drawingml/2011/main" val="1"/>
+            </a:ext>
+          </a:extLst>
+        </p:spPr>
+        <p:txBody>
+          <a:bodyPr lIns="114300" tIns="114300" rIns="114300" bIns="114300" anchor="ctr">
+            <a:spAutoFit/>
+          </a:bodyPr>
+          <a:lstStyle>
+            <a:lvl1pPr algn="ctr">
+              <a:defRPr sz="3600"/>
+            </a:lvl1pPr>
+          </a:lstStyle>
+          <a:p>
+            <a:pPr/>
+            <a:r>
+              <a:t>Enriched Genes</a:t>
+            </a:r>
+          </a:p>
+        </p:txBody>
+      </p:sp>
+      <p:sp>
+        <p:nvSpPr>
+          <p:cNvPr id="27" name="Arrow"/>
+          <p:cNvSpPr/>
+          <p:nvPr/>
+        </p:nvSpPr>
+        <p:spPr>
+          <a:xfrm>
+            <a:off x="2946400" y="31329729"/>
+            <a:ext cx="4933080" cy="1270001"/>
+          </a:xfrm>
+          <a:prstGeom prst="rightArrow">
+            <a:avLst>
+              <a:gd name="adj1" fmla="val 44000"/>
+              <a:gd name="adj2" fmla="val 65000"/>
+            </a:avLst>
+          </a:prstGeom>
+          <a:solidFill>
+            <a:srgbClr val="000000"/>
+          </a:solidFill>
+          <a:ln w="12700">
+            <a:miter lim="400000"/>
+          </a:ln>
+        </p:spPr>
+        <p:txBody>
+          <a:bodyPr lIns="50800" tIns="50800" rIns="50800" bIns="50800" anchor="ctr"/>
+          <a:lstStyle/>
+          <a:p>
+            <a:pPr>
+              <a:defRPr sz="2700"/>
+            </a:pPr>
+          </a:p>
+        </p:txBody>
+      </p:sp>
+      <p:sp>
+        <p:nvSpPr>
+          <p:cNvPr id="28" name="featureCounts"/>
+          <p:cNvSpPr txBox="1"/>
+          <p:nvPr/>
+        </p:nvSpPr>
+        <p:spPr>
+          <a:xfrm>
+            <a:off x="3478621" y="31590079"/>
+            <a:ext cx="4046437" cy="698501"/>
+          </a:xfrm>
+          <a:prstGeom prst="rect">
+            <a:avLst/>
+          </a:prstGeom>
+          <a:ln w="12700">
+            <a:miter lim="400000"/>
+          </a:ln>
+          <a:extLst>
+            <a:ext uri="{C572A759-6A51-4108-AA02-DFA0A04FC94B}">
+              <ma14:wrappingTextBoxFlag xmlns:ma14="http://schemas.microsoft.com/office/mac/drawingml/2011/main" val="1"/>
+            </a:ext>
+          </a:extLst>
+        </p:spPr>
+        <p:txBody>
+          <a:bodyPr lIns="50800" tIns="50800" rIns="50800" bIns="50800" anchor="ctr">
+            <a:spAutoFit/>
+          </a:bodyPr>
+          <a:lstStyle>
+            <a:lvl1pPr algn="ctr">
+              <a:defRPr sz="3900">
+                <a:solidFill>
+                  <a:srgbClr val="FFFFFF"/>
+                </a:solidFill>
+              </a:defRPr>
+            </a:lvl1pPr>
+          </a:lstStyle>
+          <a:p>
+            <a:pPr/>
+            <a:r>
+              <a:t>featureCounts</a:t>
+            </a:r>
+          </a:p>
+        </p:txBody>
+      </p:sp>
+      <p:sp>
+        <p:nvSpPr>
+          <p:cNvPr id="29" name="Arrow"/>
+          <p:cNvSpPr/>
+          <p:nvPr/>
+        </p:nvSpPr>
+        <p:spPr>
+          <a:xfrm flipH="1">
+            <a:off x="4019198" y="28982845"/>
+            <a:ext cx="2787484" cy="1422401"/>
+          </a:xfrm>
+          <a:prstGeom prst="rightArrow">
+            <a:avLst>
+              <a:gd name="adj1" fmla="val 44000"/>
+              <a:gd name="adj2" fmla="val 58036"/>
+            </a:avLst>
+          </a:prstGeom>
+          <a:solidFill>
+            <a:srgbClr val="000000"/>
+          </a:solidFill>
+          <a:ln w="25400">
+            <a:solidFill>
+              <a:schemeClr val="accent1"/>
+            </a:solidFill>
+          </a:ln>
+        </p:spPr>
+        <p:txBody>
+          <a:bodyPr lIns="50800" tIns="50800" rIns="50800" bIns="50800" anchor="ctr"/>
+          <a:lstStyle/>
+          <a:p>
+            <a:pPr>
+              <a:defRPr sz="2700"/>
+            </a:pPr>
+          </a:p>
+        </p:txBody>
+      </p:sp>
+      <p:sp>
+        <p:nvSpPr>
+          <p:cNvPr id="30" name="Shape 20"/>
+          <p:cNvSpPr txBox="1"/>
+          <p:nvPr/>
+        </p:nvSpPr>
+        <p:spPr>
+          <a:xfrm>
+            <a:off x="1164461" y="5509050"/>
+            <a:ext cx="9591920" cy="8591701"/>
           </a:xfrm>
           <a:prstGeom prst="rect">
             <a:avLst/>
@@ -1746,8 +2292,8 @@
             </a:pPr>
           </a:p>
           <a:p>
-            <a:pPr algn="just" defTabSz="400141">
-              <a:defRPr i="1" sz="3500">
+            <a:pPr defTabSz="400141">
+              <a:defRPr i="1" sz="3000">
                 <a:solidFill>
                   <a:srgbClr val="195B6B"/>
                 </a:solidFill>
@@ -1755,11 +2301,52 @@
               </a:defRPr>
             </a:pPr>
             <a:r>
+              <a:rPr i="0"/>
+              <a:t>The phytobacterium </a:t>
+            </a:r>
+            <a:r>
               <a:t>Pseudomonas syringae </a:t>
             </a:r>
             <a:r>
               <a:rPr i="0"/>
-              <a:t>destroys millions of crops yearly using it’s repertoire of type-III secreted effector proteins.</a:t>
+              <a:t>destroys millions of dollars of crops as a neurotrophic pest.</a:t>
+            </a:r>
+            <a:endParaRPr i="0"/>
+          </a:p>
+          <a:p>
+            <a:pPr algn="just" defTabSz="400141">
+              <a:defRPr i="1" sz="3000">
+                <a:solidFill>
+                  <a:srgbClr val="195B6B"/>
+                </a:solidFill>
+                <a:uFillTx/>
+              </a:defRPr>
+            </a:pPr>
+            <a:endParaRPr i="0"/>
+          </a:p>
+          <a:p>
+            <a:pPr algn="just" defTabSz="400141">
+              <a:defRPr i="1" sz="3000">
+                <a:solidFill>
+                  <a:srgbClr val="195B6B"/>
+                </a:solidFill>
+                <a:uFillTx/>
+              </a:defRPr>
+            </a:pPr>
+            <a:r>
+              <a:t>P. syringae </a:t>
+            </a:r>
+            <a:r>
+              <a:rPr i="0"/>
+              <a:t>enters the stomata and secrets its type-III secreted effector proteins</a:t>
+            </a:r>
+            <a:r>
+              <a:rPr baseline="31999" i="0"/>
+              <a:t>[1]</a:t>
+            </a:r>
+            <a:r>
+              <a:rPr i="0"/>
+              <a:t> into the symplast to disable host immunity. The plant responds with a transcriptional counter-attack (PAMP-triggered immunity).</a:t>
             </a:r>
           </a:p>
           <a:p>
@@ -1779,190 +2366,8 @@
             </a:pPr>
           </a:p>
           <a:p>
-            <a:pPr algn="ctr" defTabSz="400141">
-              <a:buClr>
-                <a:srgbClr val="000000"/>
-              </a:buClr>
-              <a:buSzPct val="125000"/>
-              <a:buFont typeface="Helvetica"/>
-              <a:buChar char="•"/>
-              <a:defRPr sz="2600">
-                <a:solidFill>
-                  <a:srgbClr val="195B6B"/>
-                </a:solidFill>
-                <a:uFillTx/>
-              </a:defRPr>
-            </a:pPr>
-          </a:p>
-          <a:p>
-            <a:pPr algn="ctr" defTabSz="400141">
-              <a:buClr>
-                <a:srgbClr val="000000"/>
-              </a:buClr>
-              <a:buSzPct val="125000"/>
-              <a:buFont typeface="Helvetica"/>
-              <a:buChar char="•"/>
-              <a:defRPr sz="2600">
-                <a:solidFill>
-                  <a:srgbClr val="195B6B"/>
-                </a:solidFill>
-                <a:uFillTx/>
-              </a:defRPr>
-            </a:pPr>
-          </a:p>
-          <a:p>
-            <a:pPr algn="ctr" defTabSz="400141">
-              <a:buClr>
-                <a:srgbClr val="000000"/>
-              </a:buClr>
-              <a:buSzPct val="125000"/>
-              <a:buFont typeface="Helvetica"/>
-              <a:buChar char="•"/>
-              <a:defRPr sz="2600">
-                <a:solidFill>
-                  <a:srgbClr val="195B6B"/>
-                </a:solidFill>
-                <a:uFillTx/>
-              </a:defRPr>
-            </a:pPr>
-          </a:p>
-          <a:p>
-            <a:pPr algn="ctr" defTabSz="400141">
-              <a:buClr>
-                <a:srgbClr val="000000"/>
-              </a:buClr>
-              <a:buSzPct val="125000"/>
-              <a:buFont typeface="Helvetica"/>
-              <a:buChar char="•"/>
-              <a:defRPr sz="2600">
-                <a:solidFill>
-                  <a:srgbClr val="195B6B"/>
-                </a:solidFill>
-                <a:uFillTx/>
-              </a:defRPr>
-            </a:pPr>
-          </a:p>
-          <a:p>
-            <a:pPr algn="ctr" defTabSz="400141">
-              <a:buClr>
-                <a:srgbClr val="000000"/>
-              </a:buClr>
-              <a:buSzPct val="125000"/>
-              <a:buFont typeface="Helvetica"/>
-              <a:buChar char="•"/>
-              <a:defRPr sz="2600">
-                <a:solidFill>
-                  <a:srgbClr val="195B6B"/>
-                </a:solidFill>
-                <a:uFillTx/>
-              </a:defRPr>
-            </a:pPr>
-          </a:p>
-          <a:p>
-            <a:pPr algn="ctr" defTabSz="400141">
-              <a:buClr>
-                <a:srgbClr val="000000"/>
-              </a:buClr>
-              <a:buSzPct val="125000"/>
-              <a:buFont typeface="Helvetica"/>
-              <a:buChar char="•"/>
-              <a:defRPr sz="2600">
-                <a:solidFill>
-                  <a:srgbClr val="195B6B"/>
-                </a:solidFill>
-                <a:uFillTx/>
-              </a:defRPr>
-            </a:pPr>
-          </a:p>
-          <a:p>
-            <a:pPr algn="ctr" defTabSz="400141">
-              <a:buClr>
-                <a:srgbClr val="000000"/>
-              </a:buClr>
-              <a:buSzPct val="125000"/>
-              <a:buFont typeface="Helvetica"/>
-              <a:buChar char="•"/>
-              <a:defRPr sz="2600">
-                <a:solidFill>
-                  <a:srgbClr val="195B6B"/>
-                </a:solidFill>
-                <a:uFillTx/>
-              </a:defRPr>
-            </a:pPr>
-          </a:p>
-          <a:p>
-            <a:pPr algn="ctr" defTabSz="400141">
-              <a:buClr>
-                <a:srgbClr val="000000"/>
-              </a:buClr>
-              <a:buSzPct val="125000"/>
-              <a:buFont typeface="Helvetica"/>
-              <a:buChar char="•"/>
-              <a:defRPr sz="2600">
-                <a:solidFill>
-                  <a:srgbClr val="195B6B"/>
-                </a:solidFill>
-                <a:uFillTx/>
-              </a:defRPr>
-            </a:pPr>
-          </a:p>
-          <a:p>
-            <a:pPr algn="ctr" defTabSz="400141">
-              <a:buClr>
-                <a:srgbClr val="000000"/>
-              </a:buClr>
-              <a:buSzPct val="125000"/>
-              <a:buFont typeface="Helvetica"/>
-              <a:buChar char="•"/>
-              <a:defRPr sz="2600">
-                <a:solidFill>
-                  <a:srgbClr val="195B6B"/>
-                </a:solidFill>
-                <a:uFillTx/>
-              </a:defRPr>
-            </a:pPr>
-          </a:p>
-          <a:p>
-            <a:pPr algn="ctr">
-              <a:defRPr b="1" sz="3200">
-                <a:solidFill>
-                  <a:srgbClr val="195B6B"/>
-                </a:solidFill>
-                <a:uFill>
-                  <a:solidFill>
-                    <a:srgbClr val="195B6B"/>
-                  </a:solidFill>
-                </a:uFill>
-              </a:defRPr>
-            </a:pPr>
-            <a:endParaRPr>
-              <a:uFillTx/>
-            </a:endParaRPr>
-          </a:p>
-          <a:p>
-            <a:pPr algn="ctr">
-              <a:defRPr b="1" sz="2600">
-                <a:solidFill>
-                  <a:srgbClr val="195B6B"/>
-                </a:solidFill>
-                <a:uFillTx/>
-              </a:defRPr>
-            </a:pPr>
-          </a:p>
-          <a:p>
             <a:pPr algn="just">
-              <a:defRPr b="1" sz="3100">
-                <a:solidFill>
-                  <a:srgbClr val="195B6B"/>
-                </a:solidFill>
-                <a:uFillTx/>
-              </a:defRPr>
-            </a:pPr>
-            <a:endParaRPr sz="2600"/>
-          </a:p>
-          <a:p>
-            <a:pPr algn="just">
-              <a:defRPr b="1" sz="3500">
+              <a:defRPr b="1" sz="3000">
                 <a:solidFill>
                   <a:srgbClr val="195B6B"/>
                 </a:solidFill>
@@ -1992,7 +2397,7 @@
           </a:p>
           <a:p>
             <a:pPr algn="just">
-              <a:defRPr sz="3500">
+              <a:defRPr sz="3000">
                 <a:solidFill>
                   <a:srgbClr val="195B6B"/>
                 </a:solidFill>
@@ -2000,27 +2405,28 @@
               </a:defRPr>
             </a:pPr>
             <a:r>
-              <a:t>We’ve have a system to</a:t>
-            </a:r>
-          </a:p>
-          <a:p>
-            <a:pPr algn="just">
-              <a:defRPr sz="3500">
-                <a:solidFill>
-                  <a:srgbClr val="195B6B"/>
-                </a:solidFill>
-                <a:uFillTx/>
-              </a:defRPr>
-            </a:pPr>
-            <a:r>
-              <a:t>answer that question:</a:t>
+              <a:t>We’ve adapted a system developed by Wei </a:t>
+            </a:r>
+            <a:r>
+              <a:rPr i="1"/>
+              <a:t>et. Al (2015)</a:t>
+            </a:r>
+            <a:r>
+              <a:t> to answer that question</a:t>
+            </a:r>
+            <a:r>
+              <a:rPr baseline="31999"/>
+              <a:t>[2]</a:t>
+            </a:r>
+            <a:r>
+              <a:t>:</a:t>
             </a:r>
           </a:p>
         </p:txBody>
       </p:sp>
       <p:sp>
         <p:nvSpPr>
-          <p:cNvPr id="24" name="Shape 21"/>
+          <p:cNvPr id="31" name="Shape 21"/>
           <p:cNvSpPr txBox="1"/>
           <p:nvPr/>
         </p:nvSpPr>
@@ -2291,14 +2697,14 @@
       </p:sp>
       <p:sp>
         <p:nvSpPr>
-          <p:cNvPr id="25" name="Shape 22"/>
+          <p:cNvPr id="32" name="Shape 22"/>
           <p:cNvSpPr txBox="1"/>
           <p:nvPr/>
         </p:nvSpPr>
         <p:spPr>
           <a:xfrm>
-            <a:off x="1090893" y="20935103"/>
-            <a:ext cx="9628917" cy="4857901"/>
+            <a:off x="1145962" y="20638714"/>
+            <a:ext cx="9628918" cy="6356501"/>
           </a:xfrm>
           <a:prstGeom prst="rect">
             <a:avLst/>
@@ -2327,7 +2733,7 @@
               </a:defRPr>
             </a:pPr>
             <a:r>
-              <a:t>Project Outline</a:t>
+              <a:t>Methods</a:t>
             </a:r>
             <a:endParaRPr sz="1800"/>
           </a:p>
@@ -2360,14 +2766,7 @@
               <a:t>A. thaliana </a:t>
             </a:r>
             <a:r>
-              <a:t>with </a:t>
-            </a:r>
-            <a:r>
-              <a:rPr i="1"/>
-              <a:t>P. syringae</a:t>
-            </a:r>
-            <a:r>
-              <a:t> effectors HopN1, HopB1, and HopAB1 individually (with an effector-less strain and 10 mM MgSO4 as controls).</a:t>
+              <a:t>with D36E::HopN1a, D36E::HopB1a, and D36E::HopAB1j (with D36E::EV and MgSO4 as controls) in biological triplicate.</a:t>
             </a:r>
           </a:p>
           <a:p>
@@ -2392,14 +2791,37 @@
               </a:defRPr>
             </a:pPr>
             <a:r>
-              <a:t>Sequence and analyse the plant’s RNA to profile each effector’s induced transcriptional response.</a:t>
+              <a:t>Extract, analyze, and sequence the plant’s RNA  profile each effector’s induced transcriptional response.</a:t>
+            </a:r>
+          </a:p>
+          <a:p>
+            <a:pPr defTabSz="400141">
+              <a:defRPr sz="3100">
+                <a:solidFill>
+                  <a:srgbClr val="195B6B"/>
+                </a:solidFill>
+                <a:uFillTx/>
+              </a:defRPr>
+            </a:pPr>
+          </a:p>
+          <a:p>
+            <a:pPr defTabSz="400141">
+              <a:defRPr b="1" sz="3700">
+                <a:solidFill>
+                  <a:srgbClr val="195B6B"/>
+                </a:solidFill>
+                <a:uFillTx/>
+              </a:defRPr>
+            </a:pPr>
+            <a:r>
+              <a:t>Computational analysis pipeline:</a:t>
             </a:r>
           </a:p>
         </p:txBody>
       </p:sp>
       <p:sp>
         <p:nvSpPr>
-          <p:cNvPr id="26" name="Shape 23"/>
+          <p:cNvPr id="33" name="Shape 23"/>
           <p:cNvSpPr txBox="1"/>
           <p:nvPr/>
         </p:nvSpPr>
@@ -2448,14 +2870,14 @@
       </p:sp>
       <p:sp>
         <p:nvSpPr>
-          <p:cNvPr id="27" name="Shape 25"/>
+          <p:cNvPr id="34" name="Shape 25"/>
           <p:cNvSpPr txBox="1"/>
           <p:nvPr/>
         </p:nvSpPr>
         <p:spPr>
           <a:xfrm>
-            <a:off x="2314640" y="582330"/>
-            <a:ext cx="34974086" cy="4117991"/>
+            <a:off x="2301940" y="404530"/>
+            <a:ext cx="34974086" cy="5133991"/>
           </a:xfrm>
           <a:prstGeom prst="rect">
             <a:avLst/>
@@ -2519,21 +2941,102 @@
               </a:defRPr>
             </a:pPr>
             <a:r>
-              <a:t>Nicholas Garcia, Pauline Wang, Calvin Mok, Darrell Desveaux, David Guttman</a:t>
+              <a:t>Nicholas Garcia, Pauline Wang</a:t>
+            </a:r>
+            <a:r>
+              <a:rPr baseline="31999"/>
+              <a:t>1,2</a:t>
+            </a:r>
+            <a:r>
+              <a:t>, Calvin Mok</a:t>
+            </a:r>
+            <a:r>
+              <a:rPr baseline="31999"/>
+              <a:t>1,2</a:t>
+            </a:r>
+            <a:r>
+              <a:t>, Darrell Desveaux</a:t>
+            </a:r>
+            <a:r>
+              <a:rPr baseline="31999"/>
+              <a:t>1</a:t>
+            </a:r>
+            <a:r>
+              <a:t>, David Guttman</a:t>
+            </a:r>
+            <a:r>
+              <a:rPr baseline="31999"/>
+              <a:t>1,2</a:t>
+            </a:r>
+            <a:endParaRPr baseline="31999"/>
+          </a:p>
+          <a:p>
+            <a:pPr lvl="3" defTabSz="400141">
+              <a:defRPr b="1" sz="3300">
+                <a:solidFill>
+                  <a:srgbClr val="195B6B"/>
+                </a:solidFill>
+                <a:uFillTx/>
+              </a:defRPr>
+            </a:pPr>
+            <a:r>
+              <a:rPr baseline="31999"/>
+              <a:t>                                          </a:t>
+            </a:r>
+            <a:r>
+              <a:rPr baseline="31999">
+                <a:solidFill>
+                  <a:srgbClr val="8E8E8E"/>
+                </a:solidFill>
+              </a:rPr>
+              <a:t>1</a:t>
+            </a:r>
+            <a:r>
+              <a:rPr>
+                <a:solidFill>
+                  <a:srgbClr val="8E8E8E"/>
+                </a:solidFill>
+              </a:rPr>
+              <a:t> Centre for the Analysis of Genome Evolution and Function, University of Toronto</a:t>
+            </a:r>
+            <a:endParaRPr>
+              <a:solidFill>
+                <a:srgbClr val="8E8E8E"/>
+              </a:solidFill>
+            </a:endParaRPr>
+          </a:p>
+          <a:p>
+            <a:pPr lvl="1" defTabSz="400141">
+              <a:defRPr b="1" sz="3300">
+                <a:solidFill>
+                  <a:srgbClr val="8E8E8E"/>
+                </a:solidFill>
+                <a:uFillTx/>
+              </a:defRPr>
+            </a:pPr>
+            <a:r>
+              <a:t>                            </a:t>
+            </a:r>
+            <a:r>
+              <a:rPr baseline="31999"/>
+              <a:t>2</a:t>
+            </a:r>
+            <a:r>
+              <a:t> Department of Cell &amp; Systems Biology, University of Toronto</a:t>
             </a:r>
           </a:p>
         </p:txBody>
       </p:sp>
       <p:sp>
         <p:nvSpPr>
-          <p:cNvPr id="28" name="Shape 26"/>
+          <p:cNvPr id="35" name="Shape 26"/>
           <p:cNvSpPr txBox="1"/>
           <p:nvPr/>
         </p:nvSpPr>
         <p:spPr>
           <a:xfrm>
-            <a:off x="25194583" y="27379395"/>
-            <a:ext cx="13219396" cy="2165501"/>
+            <a:off x="28883553" y="26600654"/>
+            <a:ext cx="9530426" cy="3283101"/>
           </a:xfrm>
           <a:prstGeom prst="rect">
             <a:avLst/>
@@ -2605,19 +3108,18 @@
               </a:defRPr>
             </a:pPr>
             <a:r>
-              <a:t> this can be in a super tiny font</a:t>
-            </a:r>
-            <a:endParaRPr>
-              <a:uFillTx/>
-            </a:endParaRPr>
+              <a:t>Xin X, Kvitko B, He SY. “</a:t>
+            </a:r>
+            <a:r>
+              <a:rPr i="1"/>
+              <a:t>Pseudomonas syringae</a:t>
+            </a:r>
+            <a:r>
+              <a:t>: what it takes to be a pathogen”. Nat Rev Microbiol, 16, 5, 2018, pp. 316-318. 10.1038/nrmicro.2018.17</a:t>
+            </a:r>
           </a:p>
           <a:p>
             <a:pPr>
-              <a:buClr>
-                <a:srgbClr val="195B6B"/>
-              </a:buClr>
-              <a:buSzPct val="100000"/>
-              <a:buAutoNum type="arabicPeriod" startAt="1"/>
               <a:defRPr sz="1800">
                 <a:solidFill>
                   <a:srgbClr val="195B6B"/>
@@ -2629,12 +3131,6 @@
                 </a:uFill>
               </a:defRPr>
             </a:pPr>
-            <a:r>
-              <a:t> if necessary, you can go down as low as 14pt for this part</a:t>
-            </a:r>
-            <a:endParaRPr>
-              <a:uFillTx/>
-            </a:endParaRPr>
           </a:p>
           <a:p>
             <a:pPr>
@@ -2642,7 +3138,7 @@
                 <a:srgbClr val="195B6B"/>
               </a:buClr>
               <a:buSzPct val="100000"/>
-              <a:buAutoNum type="arabicPeriod" startAt="1"/>
+              <a:buAutoNum type="arabicPeriod" startAt="2"/>
               <a:defRPr sz="1800">
                 <a:solidFill>
                   <a:srgbClr val="195B6B"/>
@@ -2655,21 +3151,35 @@
               </a:defRPr>
             </a:pPr>
             <a:r>
-              <a:t> but make sure you cite everything properly!</a:t>
+              <a:t> Wei H, Chakravarthy S, Mathieu J, Swingle B, Martin G, Collmer A. “</a:t>
+            </a:r>
+            <a:r>
+              <a:rPr i="1"/>
+              <a:t>Pseudomonas syringae</a:t>
+            </a:r>
+            <a:r>
+              <a:t> pv. </a:t>
+            </a:r>
+            <a:r>
+              <a:rPr i="1"/>
+              <a:t>tomato</a:t>
+            </a:r>
+            <a:r>
+              <a:t> DC3000 Type III Secretion Effector Polymutants Reveal an Interplay between HopAD1 and AvrPtoB”. Cell Host &amp; Microbe, 17, 2015, pp. 752-762. 10.1016/j.chom.2015.05.007</a:t>
             </a:r>
           </a:p>
         </p:txBody>
       </p:sp>
       <p:sp>
         <p:nvSpPr>
-          <p:cNvPr id="29" name="Shape 28"/>
+          <p:cNvPr id="36" name="Shape 29"/>
           <p:cNvSpPr txBox="1"/>
           <p:nvPr/>
         </p:nvSpPr>
         <p:spPr>
           <a:xfrm>
-            <a:off x="1061240" y="25647634"/>
-            <a:ext cx="9591921" cy="5823101"/>
+            <a:off x="28883553" y="29984820"/>
+            <a:ext cx="9530426" cy="2267101"/>
           </a:xfrm>
           <a:prstGeom prst="rect">
             <a:avLst/>
@@ -2690,165 +3200,6 @@
           <a:lstStyle/>
           <a:p>
             <a:pPr algn="ctr">
-              <a:defRPr b="1" sz="4800" u="sng">
-                <a:solidFill>
-                  <a:srgbClr val="195B6B"/>
-                </a:solidFill>
-                <a:uFillTx/>
-              </a:defRPr>
-            </a:pPr>
-            <a:r>
-              <a:t>Methods</a:t>
-            </a:r>
-          </a:p>
-          <a:p>
-            <a:pPr>
-              <a:defRPr b="1" sz="3200">
-                <a:solidFill>
-                  <a:srgbClr val="195B6B"/>
-                </a:solidFill>
-                <a:uFill>
-                  <a:solidFill>
-                    <a:srgbClr val="195B6B"/>
-                  </a:solidFill>
-                </a:uFill>
-              </a:defRPr>
-            </a:pPr>
-          </a:p>
-          <a:p>
-            <a:pPr>
-              <a:defRPr b="1" sz="2800">
-                <a:solidFill>
-                  <a:srgbClr val="195B6B"/>
-                </a:solidFill>
-                <a:uFill>
-                  <a:solidFill>
-                    <a:srgbClr val="195B6B"/>
-                  </a:solidFill>
-                </a:uFill>
-              </a:defRPr>
-            </a:pPr>
-            <a:r>
-              <a:rPr sz="3200"/>
-              <a:t>Wet Lab Work</a:t>
-            </a:r>
-            <a:endParaRPr>
-              <a:uFillTx/>
-            </a:endParaRPr>
-          </a:p>
-          <a:p>
-            <a:pPr defTabSz="400141">
-              <a:defRPr b="1" sz="2800">
-                <a:solidFill>
-                  <a:srgbClr val="195B6B"/>
-                </a:solidFill>
-                <a:uFill>
-                  <a:solidFill>
-                    <a:srgbClr val="195B6B"/>
-                  </a:solidFill>
-                </a:uFill>
-              </a:defRPr>
-            </a:pPr>
-          </a:p>
-          <a:p>
-            <a:pPr defTabSz="400141">
-              <a:defRPr sz="2800">
-                <a:solidFill>
-                  <a:srgbClr val="195B6B"/>
-                </a:solidFill>
-                <a:uFillTx/>
-              </a:defRPr>
-            </a:pPr>
-            <a:endParaRPr b="1"/>
-          </a:p>
-          <a:p>
-            <a:pPr defTabSz="400141">
-              <a:defRPr b="1" sz="2800">
-                <a:solidFill>
-                  <a:srgbClr val="195B6B"/>
-                </a:solidFill>
-                <a:uFillTx/>
-              </a:defRPr>
-            </a:pPr>
-          </a:p>
-          <a:p>
-            <a:pPr defTabSz="400141">
-              <a:defRPr b="1" sz="2800">
-                <a:solidFill>
-                  <a:srgbClr val="195B6B"/>
-                </a:solidFill>
-                <a:uFillTx/>
-              </a:defRPr>
-            </a:pPr>
-          </a:p>
-          <a:p>
-            <a:pPr defTabSz="400141">
-              <a:defRPr b="1" sz="2800">
-                <a:solidFill>
-                  <a:srgbClr val="195B6B"/>
-                </a:solidFill>
-                <a:uFillTx/>
-              </a:defRPr>
-            </a:pPr>
-            <a:r>
-              <a:t>RNA-Seq Pipeline</a:t>
-            </a:r>
-          </a:p>
-          <a:p>
-            <a:pPr defTabSz="400141">
-              <a:defRPr b="1" sz="2800">
-                <a:solidFill>
-                  <a:srgbClr val="195B6B"/>
-                </a:solidFill>
-                <a:uFillTx/>
-              </a:defRPr>
-            </a:pPr>
-          </a:p>
-          <a:p>
-            <a:pPr defTabSz="400141">
-              <a:defRPr sz="2800">
-                <a:solidFill>
-                  <a:srgbClr val="195B6B"/>
-                </a:solidFill>
-                <a:uFillTx/>
-              </a:defRPr>
-            </a:pPr>
-            <a:r>
-              <a:t>Always use as little text as possible to get your point across. Let diagrams, figures, and graphs tell the story. </a:t>
-            </a:r>
-          </a:p>
-        </p:txBody>
-      </p:sp>
-      <p:sp>
-        <p:nvSpPr>
-          <p:cNvPr id="30" name="Shape 29"/>
-          <p:cNvSpPr txBox="1"/>
-          <p:nvPr/>
-        </p:nvSpPr>
-        <p:spPr>
-          <a:xfrm>
-            <a:off x="25194583" y="29984820"/>
-            <a:ext cx="13219396" cy="1987701"/>
-          </a:xfrm>
-          <a:prstGeom prst="rect">
-            <a:avLst/>
-          </a:prstGeom>
-          <a:ln w="12700">
-            <a:miter lim="400000"/>
-          </a:ln>
-          <a:extLst>
-            <a:ext uri="{C572A759-6A51-4108-AA02-DFA0A04FC94B}">
-              <ma14:wrappingTextBoxFlag xmlns:ma14="http://schemas.microsoft.com/office/mac/drawingml/2011/main" val="1"/>
-            </a:ext>
-          </a:extLst>
-        </p:spPr>
-        <p:txBody>
-          <a:bodyPr lIns="333449" tIns="333449" rIns="333449" bIns="333449">
-            <a:spAutoFit/>
-          </a:bodyPr>
-          <a:lstStyle/>
-          <a:p>
-            <a:pPr algn="ctr">
               <a:defRPr b="1" sz="3200">
                 <a:solidFill>
                   <a:srgbClr val="195B6B"/>
@@ -2902,52 +3253,7 @@
       </p:sp>
       <p:sp>
         <p:nvSpPr>
-          <p:cNvPr id="31" name="Shape 31"/>
-          <p:cNvSpPr txBox="1"/>
-          <p:nvPr/>
-        </p:nvSpPr>
-        <p:spPr>
-          <a:xfrm>
-            <a:off x="2771691" y="10966949"/>
-            <a:ext cx="6171019" cy="279401"/>
-          </a:xfrm>
-          <a:prstGeom prst="rect">
-            <a:avLst/>
-          </a:prstGeom>
-          <a:ln w="12700">
-            <a:miter lim="400000"/>
-          </a:ln>
-          <a:extLst>
-            <a:ext uri="{C572A759-6A51-4108-AA02-DFA0A04FC94B}">
-              <ma14:wrappingTextBoxFlag xmlns:ma14="http://schemas.microsoft.com/office/mac/drawingml/2011/main" val="1"/>
-            </a:ext>
-          </a:extLst>
-        </p:spPr>
-        <p:txBody>
-          <a:bodyPr lIns="0" tIns="0" rIns="0" bIns="0" anchor="ctr">
-            <a:spAutoFit/>
-          </a:bodyPr>
-          <a:lstStyle>
-            <a:lvl1pPr algn="ctr">
-              <a:defRPr sz="1800">
-                <a:solidFill>
-                  <a:srgbClr val="FFFFFF"/>
-                </a:solidFill>
-                <a:uFillTx/>
-              </a:defRPr>
-            </a:lvl1pPr>
-          </a:lstStyle>
-          <a:p>
-            <a:pPr/>
-            <a:r>
-              <a:t>A diagram here can help illustrate the main problem.</a:t>
-            </a:r>
-          </a:p>
-        </p:txBody>
-      </p:sp>
-      <p:sp>
-        <p:nvSpPr>
-          <p:cNvPr id="32" name="Shape 38"/>
+          <p:cNvPr id="37" name="Shape 38"/>
           <p:cNvSpPr/>
           <p:nvPr/>
         </p:nvSpPr>
@@ -2980,7 +3286,7 @@
       </p:sp>
       <p:sp>
         <p:nvSpPr>
-          <p:cNvPr id="33" name="Shape 39"/>
+          <p:cNvPr id="38" name="Shape 39"/>
           <p:cNvSpPr txBox="1"/>
           <p:nvPr/>
         </p:nvSpPr>
@@ -3025,7 +3331,66 @@
       </p:sp>
       <p:pic>
         <p:nvPicPr>
-          <p:cNvPr id="34" name="image1.jpeg" descr="image1.jpeg"/>
+          <p:cNvPr id="39" name="image1.jpeg" descr="image1.jpeg"/>
+          <p:cNvPicPr>
+            <a:picLocks noChangeAspect="1"/>
+          </p:cNvPicPr>
+          <p:nvPr/>
+        </p:nvPicPr>
+        <p:blipFill>
+          <a:blip r:embed="rId2">
+            <a:extLst/>
+          </a:blip>
+          <a:stretch>
+            <a:fillRect/>
+          </a:stretch>
+        </p:blipFill>
+        <p:spPr>
+          <a:xfrm>
+            <a:off x="27867756" y="34204259"/>
+            <a:ext cx="3771761" cy="1297202"/>
+          </a:xfrm>
+          <a:prstGeom prst="rect">
+            <a:avLst/>
+          </a:prstGeom>
+          <a:ln w="12700">
+            <a:miter lim="400000"/>
+          </a:ln>
+        </p:spPr>
+      </p:pic>
+      <p:pic>
+        <p:nvPicPr>
+          <p:cNvPr id="40" name="CAGEF_twitterava.png" descr="CAGEF_twitterava.png"/>
+          <p:cNvPicPr>
+            <a:picLocks noChangeAspect="1"/>
+          </p:cNvPicPr>
+          <p:nvPr/>
+        </p:nvPicPr>
+        <p:blipFill>
+          <a:blip r:embed="rId3">
+            <a:extLst/>
+          </a:blip>
+          <a:srcRect l="0" t="17863" r="0" b="17863"/>
+          <a:stretch>
+            <a:fillRect/>
+          </a:stretch>
+        </p:blipFill>
+        <p:spPr>
+          <a:xfrm>
+            <a:off x="34835640" y="32683187"/>
+            <a:ext cx="4612486" cy="2964587"/>
+          </a:xfrm>
+          <a:prstGeom prst="rect">
+            <a:avLst/>
+          </a:prstGeom>
+          <a:ln w="12700">
+            <a:miter lim="400000"/>
+          </a:ln>
+        </p:spPr>
+      </p:pic>
+      <p:pic>
+        <p:nvPicPr>
+          <p:cNvPr id="41" name="pasted-movie.png" descr="pasted-movie.png"/>
           <p:cNvPicPr>
             <a:picLocks noChangeAspect="1"/>
           </p:cNvPicPr>
@@ -3041,8 +3406,8 @@
         </p:blipFill>
         <p:spPr>
           <a:xfrm>
-            <a:off x="26034341" y="34064650"/>
-            <a:ext cx="3771760" cy="1297202"/>
+            <a:off x="32206797" y="32702045"/>
+            <a:ext cx="2435093" cy="2435093"/>
           </a:xfrm>
           <a:prstGeom prst="rect">
             <a:avLst/>
@@ -3054,7 +3419,7 @@
       </p:pic>
       <p:pic>
         <p:nvPicPr>
-          <p:cNvPr id="35" name="CAGEF_twitterava.png" descr="CAGEF_twitterava.png"/>
+          <p:cNvPr id="42" name="pasted-movie.png" descr="pasted-movie.png"/>
           <p:cNvPicPr>
             <a:picLocks noChangeAspect="1"/>
           </p:cNvPicPr>
@@ -3064,65 +3429,6 @@
           <a:blip r:embed="rId5">
             <a:extLst/>
           </a:blip>
-          <a:srcRect l="0" t="17863" r="0" b="17863"/>
-          <a:stretch>
-            <a:fillRect/>
-          </a:stretch>
-        </p:blipFill>
-        <p:spPr>
-          <a:xfrm>
-            <a:off x="34038530" y="32427006"/>
-            <a:ext cx="4612486" cy="2964587"/>
-          </a:xfrm>
-          <a:prstGeom prst="rect">
-            <a:avLst/>
-          </a:prstGeom>
-          <a:ln w="12700">
-            <a:miter lim="400000"/>
-          </a:ln>
-        </p:spPr>
-      </p:pic>
-      <p:pic>
-        <p:nvPicPr>
-          <p:cNvPr id="36" name="pasted-movie.png" descr="pasted-movie.png"/>
-          <p:cNvPicPr>
-            <a:picLocks noChangeAspect="1"/>
-          </p:cNvPicPr>
-          <p:nvPr/>
-        </p:nvPicPr>
-        <p:blipFill>
-          <a:blip r:embed="rId6">
-            <a:extLst/>
-          </a:blip>
-          <a:stretch>
-            <a:fillRect/>
-          </a:stretch>
-        </p:blipFill>
-        <p:spPr>
-          <a:xfrm>
-            <a:off x="30373381" y="32199035"/>
-            <a:ext cx="3420599" cy="3420599"/>
-          </a:xfrm>
-          <a:prstGeom prst="rect">
-            <a:avLst/>
-          </a:prstGeom>
-          <a:ln w="12700">
-            <a:miter lim="400000"/>
-          </a:ln>
-        </p:spPr>
-      </p:pic>
-      <p:pic>
-        <p:nvPicPr>
-          <p:cNvPr id="37" name="pasted-movie.png" descr="pasted-movie.png"/>
-          <p:cNvPicPr>
-            <a:picLocks noChangeAspect="1"/>
-          </p:cNvPicPr>
-          <p:nvPr/>
-        </p:nvPicPr>
-        <p:blipFill>
-          <a:blip r:embed="rId7">
-            <a:extLst/>
-          </a:blip>
           <a:srcRect l="0" t="23042" r="0" b="21333"/>
           <a:stretch>
             <a:fillRect/>
@@ -3130,7 +3436,7 @@
         </p:blipFill>
         <p:spPr>
           <a:xfrm>
-            <a:off x="25940211" y="32207417"/>
+            <a:off x="27773627" y="32281394"/>
             <a:ext cx="3959920" cy="1468458"/>
           </a:xfrm>
           <a:prstGeom prst="rect">
@@ -3143,14 +3449,14 @@
       </p:pic>
       <p:sp>
         <p:nvSpPr>
-          <p:cNvPr id="38" name="Shape 27"/>
+          <p:cNvPr id="43" name="Shape 27"/>
           <p:cNvSpPr txBox="1"/>
           <p:nvPr/>
         </p:nvSpPr>
         <p:spPr>
           <a:xfrm>
-            <a:off x="25194583" y="19749388"/>
-            <a:ext cx="13219396" cy="6039001"/>
+            <a:off x="28883553" y="19749388"/>
+            <a:ext cx="9530426" cy="7334401"/>
           </a:xfrm>
           <a:prstGeom prst="rect">
             <a:avLst/>
@@ -3307,27 +3613,620 @@
           </a:p>
         </p:txBody>
       </p:sp>
+      <p:sp>
+        <p:nvSpPr>
+          <p:cNvPr id="44" name="fdsfsfsdf"/>
+          <p:cNvSpPr/>
+          <p:nvPr/>
+        </p:nvSpPr>
+        <p:spPr>
+          <a:xfrm rot="10800000">
+            <a:off x="8553483" y="27529951"/>
+            <a:ext cx="1367046" cy="1749408"/>
+          </a:xfrm>
+          <a:custGeom>
+            <a:avLst/>
+            <a:gdLst/>
+            <a:ahLst/>
+            <a:cxnLst>
+              <a:cxn ang="0">
+                <a:pos x="wd2" y="hd2"/>
+              </a:cxn>
+              <a:cxn ang="5400000">
+                <a:pos x="wd2" y="hd2"/>
+              </a:cxn>
+              <a:cxn ang="10800000">
+                <a:pos x="wd2" y="hd2"/>
+              </a:cxn>
+              <a:cxn ang="16200000">
+                <a:pos x="wd2" y="hd2"/>
+              </a:cxn>
+            </a:cxnLst>
+            <a:rect l="0" t="0" r="r" b="b"/>
+            <a:pathLst>
+              <a:path w="21600" h="21600" fill="norm" stroke="1" extrusionOk="0">
+                <a:moveTo>
+                  <a:pt x="7367" y="0"/>
+                </a:moveTo>
+                <a:lnTo>
+                  <a:pt x="0" y="7818"/>
+                </a:lnTo>
+                <a:lnTo>
+                  <a:pt x="4127" y="7818"/>
+                </a:lnTo>
+                <a:cubicBezTo>
+                  <a:pt x="4127" y="7860"/>
+                  <a:pt x="4125" y="7904"/>
+                  <a:pt x="4125" y="7946"/>
+                </a:cubicBezTo>
+                <a:cubicBezTo>
+                  <a:pt x="4125" y="15487"/>
+                  <a:pt x="11948" y="21600"/>
+                  <a:pt x="21598" y="21600"/>
+                </a:cubicBezTo>
+                <a:cubicBezTo>
+                  <a:pt x="21598" y="21600"/>
+                  <a:pt x="21600" y="21600"/>
+                  <a:pt x="21600" y="21600"/>
+                </a:cubicBezTo>
+                <a:lnTo>
+                  <a:pt x="21600" y="16556"/>
+                </a:lnTo>
+                <a:cubicBezTo>
+                  <a:pt x="21600" y="16556"/>
+                  <a:pt x="21598" y="16556"/>
+                  <a:pt x="21598" y="16556"/>
+                </a:cubicBezTo>
+                <a:cubicBezTo>
+                  <a:pt x="15512" y="16556"/>
+                  <a:pt x="10578" y="12702"/>
+                  <a:pt x="10578" y="7946"/>
+                </a:cubicBezTo>
+                <a:cubicBezTo>
+                  <a:pt x="10578" y="7903"/>
+                  <a:pt x="10582" y="7860"/>
+                  <a:pt x="10582" y="7818"/>
+                </a:cubicBezTo>
+                <a:lnTo>
+                  <a:pt x="14736" y="7818"/>
+                </a:lnTo>
+                <a:lnTo>
+                  <a:pt x="7367" y="0"/>
+                </a:lnTo>
+                <a:close/>
+              </a:path>
+            </a:pathLst>
+          </a:custGeom>
+          <a:solidFill>
+            <a:srgbClr val="000000"/>
+          </a:solidFill>
+          <a:ln w="25400">
+            <a:solidFill>
+              <a:srgbClr val="FFFFFF"/>
+            </a:solidFill>
+          </a:ln>
+          <a:extLst>
+            <a:ext uri="{C572A759-6A51-4108-AA02-DFA0A04FC94B}">
+              <ma14:wrappingTextBoxFlag xmlns:ma14="http://schemas.microsoft.com/office/mac/drawingml/2011/main" val="1"/>
+            </a:ext>
+          </a:extLst>
+        </p:spPr>
+        <p:txBody>
+          <a:bodyPr lIns="50800" tIns="50800" rIns="50800" bIns="50800" anchor="ctr"/>
+          <a:lstStyle/>
+          <a:p>
+            <a:pPr/>
+            <a:r>
+              <a:t>fdsfsfsdf</a:t>
+            </a:r>
+          </a:p>
+        </p:txBody>
+      </p:sp>
+      <p:sp>
+        <p:nvSpPr>
+          <p:cNvPr id="45" name="Trimmomatic"/>
+          <p:cNvSpPr txBox="1"/>
+          <p:nvPr/>
+        </p:nvSpPr>
+        <p:spPr>
+          <a:xfrm>
+            <a:off x="9322506" y="27884295"/>
+            <a:ext cx="3147394" cy="698501"/>
+          </a:xfrm>
+          <a:prstGeom prst="rect">
+            <a:avLst/>
+          </a:prstGeom>
+          <a:solidFill>
+            <a:srgbClr val="000000"/>
+          </a:solidFill>
+          <a:ln w="12700">
+            <a:miter lim="400000"/>
+          </a:ln>
+          <a:extLst>
+            <a:ext uri="{C572A759-6A51-4108-AA02-DFA0A04FC94B}">
+              <ma14:wrappingTextBoxFlag xmlns:ma14="http://schemas.microsoft.com/office/mac/drawingml/2011/main" val="1"/>
+            </a:ext>
+          </a:extLst>
+        </p:spPr>
+        <p:txBody>
+          <a:bodyPr lIns="50800" tIns="50800" rIns="50800" bIns="50800" anchor="ctr">
+            <a:spAutoFit/>
+          </a:bodyPr>
+          <a:lstStyle>
+            <a:lvl1pPr algn="ctr">
+              <a:defRPr sz="3900">
+                <a:solidFill>
+                  <a:srgbClr val="FFFFFF"/>
+                </a:solidFill>
+              </a:defRPr>
+            </a:lvl1pPr>
+          </a:lstStyle>
+          <a:p>
+            <a:pPr/>
+            <a:r>
+              <a:t>Trimmomatic</a:t>
+            </a:r>
+          </a:p>
+        </p:txBody>
+      </p:sp>
+      <p:sp>
+        <p:nvSpPr>
+          <p:cNvPr id="46" name="Arrow"/>
+          <p:cNvSpPr/>
+          <p:nvPr/>
+        </p:nvSpPr>
+        <p:spPr>
+          <a:xfrm flipH="1">
+            <a:off x="6373895" y="28989195"/>
+            <a:ext cx="2928574" cy="1409701"/>
+          </a:xfrm>
+          <a:prstGeom prst="rightArrow">
+            <a:avLst>
+              <a:gd name="adj1" fmla="val 44000"/>
+              <a:gd name="adj2" fmla="val 58559"/>
+            </a:avLst>
+          </a:prstGeom>
+          <a:solidFill>
+            <a:srgbClr val="000000"/>
+          </a:solidFill>
+          <a:ln w="25400">
+            <a:solidFill>
+              <a:srgbClr val="FFFFFF"/>
+            </a:solidFill>
+          </a:ln>
+        </p:spPr>
+        <p:txBody>
+          <a:bodyPr lIns="50800" tIns="50800" rIns="50800" bIns="50800" anchor="ctr"/>
+          <a:lstStyle/>
+          <a:p>
+            <a:pPr>
+              <a:defRPr sz="2700"/>
+            </a:pPr>
+          </a:p>
+        </p:txBody>
+      </p:sp>
+      <p:sp>
+        <p:nvSpPr>
+          <p:cNvPr id="47" name="FastQC"/>
+          <p:cNvSpPr txBox="1"/>
+          <p:nvPr/>
+        </p:nvSpPr>
+        <p:spPr>
+          <a:xfrm>
+            <a:off x="7009221" y="29332095"/>
+            <a:ext cx="2040311" cy="698501"/>
+          </a:xfrm>
+          <a:prstGeom prst="rect">
+            <a:avLst/>
+          </a:prstGeom>
+          <a:ln w="12700">
+            <a:miter lim="400000"/>
+          </a:ln>
+          <a:extLst>
+            <a:ext uri="{C572A759-6A51-4108-AA02-DFA0A04FC94B}">
+              <ma14:wrappingTextBoxFlag xmlns:ma14="http://schemas.microsoft.com/office/mac/drawingml/2011/main" val="1"/>
+            </a:ext>
+          </a:extLst>
+        </p:spPr>
+        <p:txBody>
+          <a:bodyPr lIns="50800" tIns="50800" rIns="50800" bIns="50800" anchor="ctr">
+            <a:spAutoFit/>
+          </a:bodyPr>
+          <a:lstStyle>
+            <a:lvl1pPr algn="ctr">
+              <a:defRPr sz="3900">
+                <a:solidFill>
+                  <a:srgbClr val="FFFFFF"/>
+                </a:solidFill>
+              </a:defRPr>
+            </a:lvl1pPr>
+          </a:lstStyle>
+          <a:p>
+            <a:pPr/>
+            <a:r>
+              <a:t>FastQC</a:t>
+            </a:r>
+          </a:p>
+        </p:txBody>
+      </p:sp>
+      <p:sp>
+        <p:nvSpPr>
+          <p:cNvPr id="48" name=".fastq files"/>
+          <p:cNvSpPr txBox="1"/>
+          <p:nvPr/>
+        </p:nvSpPr>
+        <p:spPr>
+          <a:xfrm>
+            <a:off x="8936638" y="29281295"/>
+            <a:ext cx="2409693" cy="800101"/>
+          </a:xfrm>
+          <a:prstGeom prst="rect">
+            <a:avLst/>
+          </a:prstGeom>
+          <a:solidFill>
+            <a:srgbClr val="FFFFFF"/>
+          </a:solidFill>
+          <a:ln w="25400">
+            <a:solidFill>
+              <a:srgbClr val="000000"/>
+            </a:solidFill>
+            <a:miter lim="400000"/>
+          </a:ln>
+          <a:extLst>
+            <a:ext uri="{C572A759-6A51-4108-AA02-DFA0A04FC94B}">
+              <ma14:wrappingTextBoxFlag xmlns:ma14="http://schemas.microsoft.com/office/mac/drawingml/2011/main" val="1"/>
+            </a:ext>
+          </a:extLst>
+        </p:spPr>
+        <p:txBody>
+          <a:bodyPr lIns="114300" tIns="114300" rIns="114300" bIns="114300" anchor="ctr">
+            <a:spAutoFit/>
+          </a:bodyPr>
+          <a:lstStyle>
+            <a:lvl1pPr algn="ctr">
+              <a:defRPr sz="3600"/>
+            </a:lvl1pPr>
+          </a:lstStyle>
+          <a:p>
+            <a:pPr/>
+            <a:r>
+              <a:t>.fastq files</a:t>
+            </a:r>
+          </a:p>
+        </p:txBody>
+      </p:sp>
+      <p:sp>
+        <p:nvSpPr>
+          <p:cNvPr id="49" name="Hisat2"/>
+          <p:cNvSpPr txBox="1"/>
+          <p:nvPr/>
+        </p:nvSpPr>
+        <p:spPr>
+          <a:xfrm>
+            <a:off x="4764033" y="29387880"/>
+            <a:ext cx="1535089" cy="596901"/>
+          </a:xfrm>
+          <a:prstGeom prst="rect">
+            <a:avLst/>
+          </a:prstGeom>
+          <a:solidFill>
+            <a:srgbClr val="000000"/>
+          </a:solidFill>
+          <a:ln w="12700">
+            <a:miter lim="400000"/>
+          </a:ln>
+          <a:extLst>
+            <a:ext uri="{C572A759-6A51-4108-AA02-DFA0A04FC94B}">
+              <ma14:wrappingTextBoxFlag xmlns:ma14="http://schemas.microsoft.com/office/mac/drawingml/2011/main" val="1"/>
+            </a:ext>
+          </a:extLst>
+        </p:spPr>
+        <p:txBody>
+          <a:bodyPr lIns="0" tIns="0" rIns="0" bIns="0" anchor="ctr">
+            <a:spAutoFit/>
+          </a:bodyPr>
+          <a:lstStyle>
+            <a:lvl1pPr algn="ctr">
+              <a:defRPr sz="3900">
+                <a:solidFill>
+                  <a:srgbClr val="FFFFFF"/>
+                </a:solidFill>
+              </a:defRPr>
+            </a:lvl1pPr>
+          </a:lstStyle>
+          <a:p>
+            <a:pPr/>
+            <a:r>
+              <a:t>Hisat2</a:t>
+            </a:r>
+          </a:p>
+        </p:txBody>
+      </p:sp>
+      <p:sp>
+        <p:nvSpPr>
+          <p:cNvPr id="50" name="TAIR10 reference genome"/>
+          <p:cNvSpPr txBox="1"/>
+          <p:nvPr/>
+        </p:nvSpPr>
+        <p:spPr>
+          <a:xfrm>
+            <a:off x="989397" y="31107479"/>
+            <a:ext cx="1981225" cy="1714501"/>
+          </a:xfrm>
+          <a:prstGeom prst="rect">
+            <a:avLst/>
+          </a:prstGeom>
+          <a:solidFill>
+            <a:srgbClr val="FFFFFF"/>
+          </a:solidFill>
+          <a:ln w="25400">
+            <a:solidFill>
+              <a:srgbClr val="000000"/>
+            </a:solidFill>
+            <a:miter lim="400000"/>
+          </a:ln>
+          <a:extLst>
+            <a:ext uri="{C572A759-6A51-4108-AA02-DFA0A04FC94B}">
+              <ma14:wrappingTextBoxFlag xmlns:ma14="http://schemas.microsoft.com/office/mac/drawingml/2011/main" val="1"/>
+            </a:ext>
+          </a:extLst>
+        </p:spPr>
+        <p:txBody>
+          <a:bodyPr lIns="114300" tIns="114300" rIns="114300" bIns="114300" anchor="ctr">
+            <a:spAutoFit/>
+          </a:bodyPr>
+          <a:lstStyle/>
+          <a:p>
+            <a:pPr algn="ctr">
+              <a:defRPr sz="3600"/>
+            </a:pPr>
+            <a:r>
+              <a:t>TAIR10 </a:t>
+            </a:r>
+            <a:r>
+              <a:rPr sz="3000"/>
+              <a:t>reference genome</a:t>
+            </a:r>
+          </a:p>
+        </p:txBody>
+      </p:sp>
+      <p:sp>
+        <p:nvSpPr>
+          <p:cNvPr id="51" name="Arrow"/>
+          <p:cNvSpPr/>
+          <p:nvPr/>
+        </p:nvSpPr>
+        <p:spPr>
+          <a:xfrm>
+            <a:off x="4280629" y="27141345"/>
+            <a:ext cx="4734525" cy="1270001"/>
+          </a:xfrm>
+          <a:prstGeom prst="rightArrow">
+            <a:avLst>
+              <a:gd name="adj1" fmla="val 44000"/>
+              <a:gd name="adj2" fmla="val 65000"/>
+            </a:avLst>
+          </a:prstGeom>
+          <a:solidFill>
+            <a:srgbClr val="000000"/>
+          </a:solidFill>
+          <a:ln w="25400">
+            <a:solidFill>
+              <a:srgbClr val="FFFFFF"/>
+            </a:solidFill>
+          </a:ln>
+        </p:spPr>
+        <p:txBody>
+          <a:bodyPr lIns="50800" tIns="50800" rIns="50800" bIns="50800" anchor="ctr"/>
+          <a:lstStyle/>
+          <a:p>
+            <a:pPr>
+              <a:defRPr sz="2700"/>
+            </a:pPr>
+          </a:p>
+        </p:txBody>
+      </p:sp>
+      <p:sp>
+        <p:nvSpPr>
+          <p:cNvPr id="52" name="FastQC"/>
+          <p:cNvSpPr txBox="1"/>
+          <p:nvPr/>
+        </p:nvSpPr>
+        <p:spPr>
+          <a:xfrm>
+            <a:off x="5236092" y="27414395"/>
+            <a:ext cx="2289440" cy="698501"/>
+          </a:xfrm>
+          <a:prstGeom prst="rect">
+            <a:avLst/>
+          </a:prstGeom>
+          <a:ln w="12700">
+            <a:miter lim="400000"/>
+          </a:ln>
+          <a:extLst>
+            <a:ext uri="{C572A759-6A51-4108-AA02-DFA0A04FC94B}">
+              <ma14:wrappingTextBoxFlag xmlns:ma14="http://schemas.microsoft.com/office/mac/drawingml/2011/main" val="1"/>
+            </a:ext>
+          </a:extLst>
+        </p:spPr>
+        <p:txBody>
+          <a:bodyPr lIns="50800" tIns="50800" rIns="50800" bIns="50800" anchor="ctr">
+            <a:spAutoFit/>
+          </a:bodyPr>
+          <a:lstStyle>
+            <a:lvl1pPr algn="ctr">
+              <a:defRPr sz="3900">
+                <a:solidFill>
+                  <a:srgbClr val="FFFFFF"/>
+                </a:solidFill>
+              </a:defRPr>
+            </a:lvl1pPr>
+          </a:lstStyle>
+          <a:p>
+            <a:pPr/>
+            <a:r>
+              <a:t>FastQC</a:t>
+            </a:r>
+          </a:p>
+        </p:txBody>
+      </p:sp>
+      <p:sp>
+        <p:nvSpPr>
+          <p:cNvPr id="53" name=".fastq files"/>
+          <p:cNvSpPr txBox="1"/>
+          <p:nvPr/>
+        </p:nvSpPr>
+        <p:spPr>
+          <a:xfrm>
+            <a:off x="1615612" y="27363595"/>
+            <a:ext cx="2740058" cy="800101"/>
+          </a:xfrm>
+          <a:prstGeom prst="rect">
+            <a:avLst/>
+          </a:prstGeom>
+          <a:solidFill>
+            <a:srgbClr val="FFFFFF"/>
+          </a:solidFill>
+          <a:ln w="25400">
+            <a:solidFill>
+              <a:srgbClr val="000000"/>
+            </a:solidFill>
+            <a:miter lim="400000"/>
+          </a:ln>
+          <a:extLst>
+            <a:ext uri="{C572A759-6A51-4108-AA02-DFA0A04FC94B}">
+              <ma14:wrappingTextBoxFlag xmlns:ma14="http://schemas.microsoft.com/office/mac/drawingml/2011/main" val="1"/>
+            </a:ext>
+          </a:extLst>
+        </p:spPr>
+        <p:txBody>
+          <a:bodyPr lIns="114300" tIns="114300" rIns="114300" bIns="114300" anchor="ctr">
+            <a:spAutoFit/>
+          </a:bodyPr>
+          <a:lstStyle>
+            <a:lvl1pPr algn="ctr">
+              <a:defRPr sz="3600"/>
+            </a:lvl1pPr>
+          </a:lstStyle>
+          <a:p>
+            <a:pPr/>
+            <a:r>
+              <a:t>.fastq files</a:t>
+            </a:r>
+          </a:p>
+        </p:txBody>
+      </p:sp>
+      <p:sp>
+        <p:nvSpPr>
+          <p:cNvPr id="54" name="gProfiler2"/>
+          <p:cNvSpPr txBox="1"/>
+          <p:nvPr/>
+        </p:nvSpPr>
+        <p:spPr>
+          <a:xfrm>
+            <a:off x="2348921" y="34275010"/>
+            <a:ext cx="2289440" cy="698501"/>
+          </a:xfrm>
+          <a:prstGeom prst="rect">
+            <a:avLst/>
+          </a:prstGeom>
+          <a:ln w="12700">
+            <a:miter lim="400000"/>
+          </a:ln>
+          <a:extLst>
+            <a:ext uri="{C572A759-6A51-4108-AA02-DFA0A04FC94B}">
+              <ma14:wrappingTextBoxFlag xmlns:ma14="http://schemas.microsoft.com/office/mac/drawingml/2011/main" val="1"/>
+            </a:ext>
+          </a:extLst>
+        </p:spPr>
+        <p:txBody>
+          <a:bodyPr lIns="50800" tIns="50800" rIns="50800" bIns="50800" anchor="ctr">
+            <a:spAutoFit/>
+          </a:bodyPr>
+          <a:lstStyle>
+            <a:lvl1pPr algn="ctr">
+              <a:defRPr sz="3900">
+                <a:solidFill>
+                  <a:srgbClr val="FFFFFF"/>
+                </a:solidFill>
+              </a:defRPr>
+            </a:lvl1pPr>
+          </a:lstStyle>
+          <a:p>
+            <a:pPr/>
+            <a:r>
+              <a:t>gProfiler2</a:t>
+            </a:r>
+          </a:p>
+        </p:txBody>
+      </p:sp>
+      <p:sp>
+        <p:nvSpPr>
+          <p:cNvPr id="55" name="Enriched GO Terms"/>
+          <p:cNvSpPr txBox="1"/>
+          <p:nvPr/>
+        </p:nvSpPr>
+        <p:spPr>
+          <a:xfrm>
+            <a:off x="5420048" y="34262310"/>
+            <a:ext cx="4734525" cy="800101"/>
+          </a:xfrm>
+          <a:prstGeom prst="rect">
+            <a:avLst/>
+          </a:prstGeom>
+          <a:solidFill>
+            <a:srgbClr val="FFFFFF"/>
+          </a:solidFill>
+          <a:ln w="25400">
+            <a:solidFill>
+              <a:srgbClr val="000000"/>
+            </a:solidFill>
+            <a:miter lim="400000"/>
+          </a:ln>
+          <a:extLst>
+            <a:ext uri="{C572A759-6A51-4108-AA02-DFA0A04FC94B}">
+              <ma14:wrappingTextBoxFlag xmlns:ma14="http://schemas.microsoft.com/office/mac/drawingml/2011/main" val="1"/>
+            </a:ext>
+          </a:extLst>
+        </p:spPr>
+        <p:txBody>
+          <a:bodyPr lIns="114300" tIns="114300" rIns="114300" bIns="114300" anchor="ctr">
+            <a:spAutoFit/>
+          </a:bodyPr>
+          <a:lstStyle>
+            <a:lvl1pPr algn="ctr">
+              <a:defRPr sz="3600"/>
+            </a:lvl1pPr>
+          </a:lstStyle>
+          <a:p>
+            <a:pPr/>
+            <a:r>
+              <a:t>Enriched GO Terms</a:t>
+            </a:r>
+          </a:p>
+        </p:txBody>
+      </p:sp>
       <p:pic>
         <p:nvPicPr>
-          <p:cNvPr id="39" name="model_system.png" descr="model_system.png"/>
+          <p:cNvPr id="56" name="D36E_system.png" descr="D36E_system.png"/>
           <p:cNvPicPr>
             <a:picLocks noChangeAspect="1"/>
           </p:cNvPicPr>
           <p:nvPr/>
         </p:nvPicPr>
         <p:blipFill>
-          <a:blip r:embed="rId8">
+          <a:blip r:embed="rId6">
             <a:extLst/>
           </a:blip>
-          <a:srcRect l="4261" t="19947" r="1600" b="3261"/>
+          <a:srcRect l="3285" t="2605" r="0" b="0"/>
           <a:stretch>
             <a:fillRect/>
           </a:stretch>
         </p:blipFill>
         <p:spPr>
           <a:xfrm>
-            <a:off x="525019" y="8578520"/>
-            <a:ext cx="10870781" cy="4117867"/>
+            <a:off x="641479" y="14151021"/>
+            <a:ext cx="10870818" cy="5072560"/>
           </a:xfrm>
           <a:prstGeom prst="rect">
             <a:avLst/>
@@ -3337,6 +4236,1142 @@
           </a:ln>
         </p:spPr>
       </p:pic>
+      <p:sp>
+        <p:nvSpPr>
+          <p:cNvPr id="57" name="Rectangle"/>
+          <p:cNvSpPr/>
+          <p:nvPr/>
+        </p:nvSpPr>
+        <p:spPr>
+          <a:xfrm>
+            <a:off x="408559" y="13832290"/>
+            <a:ext cx="3248820" cy="1270001"/>
+          </a:xfrm>
+          <a:prstGeom prst="rect">
+            <a:avLst/>
+          </a:prstGeom>
+          <a:solidFill>
+            <a:srgbClr val="FFFFFF"/>
+          </a:solidFill>
+          <a:ln w="12700">
+            <a:miter lim="400000"/>
+          </a:ln>
+        </p:spPr>
+        <p:txBody>
+          <a:bodyPr lIns="50800" tIns="50800" rIns="50800" bIns="50800" anchor="ctr"/>
+          <a:lstStyle/>
+          <a:p>
+            <a:pPr/>
+          </a:p>
+        </p:txBody>
+      </p:sp>
+      <p:pic>
+        <p:nvPicPr>
+          <p:cNvPr id="58" name="DEG_heatmap_1h_annotated.pdf" descr="DEG_heatmap_1h_annotated.pdf"/>
+          <p:cNvPicPr>
+            <a:picLocks noChangeAspect="1"/>
+          </p:cNvPicPr>
+          <p:nvPr/>
+        </p:nvPicPr>
+        <p:blipFill>
+          <a:blip r:embed="rId7">
+            <a:extLst/>
+          </a:blip>
+          <a:srcRect l="37147" t="41852" r="37147" b="41852"/>
+          <a:stretch>
+            <a:fillRect/>
+          </a:stretch>
+        </p:blipFill>
+        <p:spPr>
+          <a:xfrm>
+            <a:off x="15465623" y="6803421"/>
+            <a:ext cx="8667193" cy="9419292"/>
+          </a:xfrm>
+          <a:prstGeom prst="rect">
+            <a:avLst/>
+          </a:prstGeom>
+          <a:ln w="12700">
+            <a:miter lim="400000"/>
+          </a:ln>
+        </p:spPr>
+      </p:pic>
+      <p:graphicFrame>
+        <p:nvGraphicFramePr>
+          <p:cNvPr id="59" name="Table 1"/>
+          <p:cNvGraphicFramePr/>
+          <p:nvPr/>
+        </p:nvGraphicFramePr>
+        <p:xfrm>
+          <a:off x="14236751" y="16676931"/>
+          <a:ext cx="7152006" cy="4445001"/>
+        </p:xfrm>
+        <a:graphic xmlns:a="http://schemas.openxmlformats.org/drawingml/2006/main">
+          <a:graphicData uri="http://schemas.openxmlformats.org/drawingml/2006/table">
+            <a:tbl>
+              <a:tblPr firstCol="1" firstRow="0" lastCol="0" lastRow="0" bandCol="0" bandRow="1" rtl="0">
+                <a:tableStyleId>{33BA23B1-9221-436E-865A-0063620EA4FD}</a:tableStyleId>
+              </a:tblPr>
+              <a:tblGrid>
+                <a:gridCol w="2828310"/>
+                <a:gridCol w="2749431"/>
+                <a:gridCol w="1305004"/>
+                <a:gridCol w="1917382"/>
+                <a:gridCol w="2304335"/>
+              </a:tblGrid>
+              <a:tr h="889000">
+                <a:tc gridSpan="5">
+                  <a:txBody>
+                    <a:bodyPr/>
+                    <a:lstStyle/>
+                    <a:p>
+                      <a:pPr algn="ctr">
+                        <a:defRPr b="0" sz="1800">
+                          <a:solidFill>
+                            <a:srgbClr val="000000"/>
+                          </a:solidFill>
+                          <a:uFillTx/>
+                        </a:defRPr>
+                      </a:pPr>
+                      <a:r>
+                        <a:rPr b="1" sz="3100">
+                          <a:solidFill>
+                            <a:srgbClr val="FFFFFF"/>
+                          </a:solidFill>
+                          <a:uFill>
+                            <a:solidFill>
+                              <a:srgbClr val="000000"/>
+                            </a:solidFill>
+                          </a:uFill>
+                          <a:sym typeface="Helvetica"/>
+                        </a:rPr>
+                        <a:t>Genes with significantly-altered expression</a:t>
+                      </a:r>
+                    </a:p>
+                  </a:txBody>
+                  <a:tcPr marL="0" marR="0" marT="0" marB="0" anchor="ctr" anchorCtr="0" horzOverflow="overflow"/>
+                </a:tc>
+                <a:tc hMerge="1">
+                  <a:tcPr/>
+                </a:tc>
+                <a:tc hMerge="1">
+                  <a:tcPr/>
+                </a:tc>
+                <a:tc hMerge="1">
+                  <a:tcPr/>
+                </a:tc>
+                <a:tc hMerge="1">
+                  <a:tcPr/>
+                </a:tc>
+              </a:tr>
+              <a:tr h="1039911">
+                <a:tc>
+                  <a:txBody>
+                    <a:bodyPr/>
+                    <a:lstStyle/>
+                    <a:p>
+                      <a:pPr algn="ctr">
+                        <a:defRPr b="0" sz="1800">
+                          <a:solidFill>
+                            <a:srgbClr val="000000"/>
+                          </a:solidFill>
+                          <a:uFillTx/>
+                        </a:defRPr>
+                      </a:pPr>
+                      <a:r>
+                        <a:rPr b="1" sz="3100">
+                          <a:solidFill>
+                            <a:srgbClr val="FFFFFF"/>
+                          </a:solidFill>
+                          <a:uFill>
+                            <a:solidFill>
+                              <a:srgbClr val="000000"/>
+                            </a:solidFill>
+                          </a:uFill>
+                          <a:sym typeface="Helvetica"/>
+                        </a:rPr>
+                        <a:t>Data comparison</a:t>
+                      </a:r>
+                    </a:p>
+                  </a:txBody>
+                  <a:tcPr marL="0" marR="0" marT="0" marB="0" anchor="b" anchorCtr="0" horzOverflow="overflow">
+                    <a:lnB w="38100">
+                      <a:solidFill>
+                        <a:srgbClr val="FFFFFF"/>
+                      </a:solidFill>
+                    </a:lnB>
+                  </a:tcPr>
+                </a:tc>
+                <a:tc>
+                  <a:txBody>
+                    <a:bodyPr/>
+                    <a:lstStyle/>
+                    <a:p>
+                      <a:pPr algn="ctr">
+                        <a:defRPr sz="1800">
+                          <a:uFillTx/>
+                        </a:defRPr>
+                      </a:pPr>
+                      <a:r>
+                        <a:rPr b="1" sz="3100">
+                          <a:solidFill>
+                            <a:srgbClr val="FFFFFF"/>
+                          </a:solidFill>
+                          <a:uFill>
+                            <a:solidFill>
+                              <a:srgbClr val="000000"/>
+                            </a:solidFill>
+                          </a:uFill>
+                          <a:sym typeface="Helvetica"/>
+                        </a:rPr>
+                        <a:t>Timepoint post-infection</a:t>
+                      </a:r>
+                    </a:p>
+                  </a:txBody>
+                  <a:tcPr marL="0" marR="0" marT="0" marB="0" anchor="b" anchorCtr="0" horzOverflow="overflow">
+                    <a:lnB w="38100">
+                      <a:solidFill>
+                        <a:srgbClr val="FFFFFF"/>
+                      </a:solidFill>
+                    </a:lnB>
+                    <a:solidFill>
+                      <a:srgbClr val="000000"/>
+                    </a:solidFill>
+                  </a:tcPr>
+                </a:tc>
+                <a:tc>
+                  <a:txBody>
+                    <a:bodyPr/>
+                    <a:lstStyle/>
+                    <a:p>
+                      <a:pPr algn="ctr">
+                        <a:defRPr sz="1800">
+                          <a:uFillTx/>
+                        </a:defRPr>
+                      </a:pPr>
+                      <a:r>
+                        <a:rPr b="1" sz="3100">
+                          <a:solidFill>
+                            <a:srgbClr val="FFFFFF"/>
+                          </a:solidFill>
+                          <a:uFill>
+                            <a:solidFill>
+                              <a:srgbClr val="000000"/>
+                            </a:solidFill>
+                          </a:uFill>
+                          <a:sym typeface="Helvetica"/>
+                        </a:rPr>
+                        <a:t>Total</a:t>
+                      </a:r>
+                    </a:p>
+                  </a:txBody>
+                  <a:tcPr marL="0" marR="0" marT="0" marB="0" anchor="b" anchorCtr="0" horzOverflow="overflow">
+                    <a:lnB w="38100">
+                      <a:solidFill>
+                        <a:srgbClr val="FFFFFF"/>
+                      </a:solidFill>
+                    </a:lnB>
+                    <a:solidFill>
+                      <a:srgbClr val="000000"/>
+                    </a:solidFill>
+                  </a:tcPr>
+                </a:tc>
+                <a:tc>
+                  <a:txBody>
+                    <a:bodyPr/>
+                    <a:lstStyle/>
+                    <a:p>
+                      <a:pPr algn="ctr">
+                        <a:defRPr sz="1800">
+                          <a:uFillTx/>
+                        </a:defRPr>
+                      </a:pPr>
+                      <a:r>
+                        <a:rPr b="1" sz="3100">
+                          <a:solidFill>
+                            <a:srgbClr val="FFFFFF"/>
+                          </a:solidFill>
+                          <a:uFill>
+                            <a:solidFill>
+                              <a:srgbClr val="000000"/>
+                            </a:solidFill>
+                          </a:uFill>
+                          <a:sym typeface="Helvetica"/>
+                        </a:rPr>
+                        <a:t>Induced</a:t>
+                      </a:r>
+                    </a:p>
+                  </a:txBody>
+                  <a:tcPr marL="0" marR="0" marT="0" marB="0" anchor="b" anchorCtr="0" horzOverflow="overflow">
+                    <a:lnB w="38100">
+                      <a:solidFill>
+                        <a:srgbClr val="FFFFFF"/>
+                      </a:solidFill>
+                    </a:lnB>
+                    <a:solidFill>
+                      <a:srgbClr val="000000"/>
+                    </a:solidFill>
+                  </a:tcPr>
+                </a:tc>
+                <a:tc>
+                  <a:txBody>
+                    <a:bodyPr/>
+                    <a:lstStyle/>
+                    <a:p>
+                      <a:pPr algn="ctr">
+                        <a:defRPr sz="1800">
+                          <a:uFillTx/>
+                        </a:defRPr>
+                      </a:pPr>
+                      <a:r>
+                        <a:rPr b="1" sz="3100">
+                          <a:solidFill>
+                            <a:srgbClr val="FFFFFF"/>
+                          </a:solidFill>
+                          <a:uFill>
+                            <a:solidFill>
+                              <a:srgbClr val="000000"/>
+                            </a:solidFill>
+                          </a:uFill>
+                          <a:sym typeface="Helvetica"/>
+                        </a:rPr>
+                        <a:t>Repressed</a:t>
+                      </a:r>
+                    </a:p>
+                  </a:txBody>
+                  <a:tcPr marL="0" marR="0" marT="0" marB="0" anchor="b" anchorCtr="0" horzOverflow="overflow">
+                    <a:lnB w="38100">
+                      <a:solidFill>
+                        <a:srgbClr val="FFFFFF"/>
+                      </a:solidFill>
+                    </a:lnB>
+                    <a:solidFill>
+                      <a:srgbClr val="000000"/>
+                    </a:solidFill>
+                  </a:tcPr>
+                </a:tc>
+              </a:tr>
+              <a:tr h="1190625">
+                <a:tc>
+                  <a:txBody>
+                    <a:bodyPr/>
+                    <a:lstStyle/>
+                    <a:p>
+                      <a:pPr algn="ctr">
+                        <a:defRPr sz="2900">
+                          <a:sym typeface="Helvetica"/>
+                        </a:defRPr>
+                      </a:pPr>
+                      <a:r>
+                        <a:rPr b="0"/>
+                        <a:t>D36E::</a:t>
+                      </a:r>
+                      <a:r>
+                        <a:t>HopN1a </a:t>
+                      </a:r>
+                      <a:r>
+                        <a:rPr b="0"/>
+                        <a:t>vs D36E::EV</a:t>
+                      </a:r>
+                    </a:p>
+                  </a:txBody>
+                  <a:tcPr marL="0" marR="0" marT="0" marB="0" anchor="ctr" anchorCtr="0" horzOverflow="overflow">
+                    <a:lnT w="38100">
+                      <a:solidFill>
+                        <a:srgbClr val="FFFFFF"/>
+                      </a:solidFill>
+                    </a:lnT>
+                    <a:solidFill>
+                      <a:srgbClr val="535353"/>
+                    </a:solidFill>
+                  </a:tcPr>
+                </a:tc>
+                <a:tc>
+                  <a:txBody>
+                    <a:bodyPr/>
+                    <a:lstStyle/>
+                    <a:p>
+                      <a:pPr algn="ctr">
+                        <a:defRPr sz="1800">
+                          <a:uFillTx/>
+                        </a:defRPr>
+                      </a:pPr>
+                      <a:r>
+                        <a:rPr sz="2900">
+                          <a:uFill>
+                            <a:solidFill>
+                              <a:srgbClr val="000000"/>
+                            </a:solidFill>
+                          </a:uFill>
+                          <a:sym typeface="Helvetica"/>
+                        </a:rPr>
+                        <a:t>1 hour
+</a:t>
+                      </a:r>
+                    </a:p>
+                  </a:txBody>
+                  <a:tcPr marL="0" marR="0" marT="0" marB="0" anchor="ctr" anchorCtr="0" horzOverflow="overflow">
+                    <a:lnT w="38100">
+                      <a:solidFill>
+                        <a:srgbClr val="FFFFFF"/>
+                      </a:solidFill>
+                    </a:lnT>
+                  </a:tcPr>
+                </a:tc>
+                <a:tc>
+                  <a:txBody>
+                    <a:bodyPr/>
+                    <a:lstStyle/>
+                    <a:p>
+                      <a:pPr algn="ctr">
+                        <a:defRPr sz="1800">
+                          <a:uFillTx/>
+                        </a:defRPr>
+                      </a:pPr>
+                      <a:r>
+                        <a:rPr sz="3100">
+                          <a:uFill>
+                            <a:solidFill>
+                              <a:srgbClr val="000000"/>
+                            </a:solidFill>
+                          </a:uFill>
+                          <a:sym typeface="Helvetica"/>
+                        </a:rPr>
+                        <a:t>2</a:t>
+                      </a:r>
+                    </a:p>
+                  </a:txBody>
+                  <a:tcPr marL="0" marR="0" marT="0" marB="0" anchor="ctr" anchorCtr="0" horzOverflow="overflow">
+                    <a:lnT w="38100">
+                      <a:solidFill>
+                        <a:srgbClr val="FFFFFF"/>
+                      </a:solidFill>
+                    </a:lnT>
+                  </a:tcPr>
+                </a:tc>
+                <a:tc>
+                  <a:txBody>
+                    <a:bodyPr/>
+                    <a:lstStyle/>
+                    <a:p>
+                      <a:pPr algn="ctr">
+                        <a:defRPr sz="1800">
+                          <a:uFillTx/>
+                        </a:defRPr>
+                      </a:pPr>
+                      <a:r>
+                        <a:rPr sz="3100">
+                          <a:uFill>
+                            <a:solidFill>
+                              <a:srgbClr val="000000"/>
+                            </a:solidFill>
+                          </a:uFill>
+                          <a:sym typeface="Helvetica"/>
+                        </a:rPr>
+                        <a:t>1</a:t>
+                      </a:r>
+                    </a:p>
+                  </a:txBody>
+                  <a:tcPr marL="0" marR="0" marT="0" marB="0" anchor="ctr" anchorCtr="0" horzOverflow="overflow">
+                    <a:lnT w="38100">
+                      <a:solidFill>
+                        <a:srgbClr val="FFFFFF"/>
+                      </a:solidFill>
+                    </a:lnT>
+                  </a:tcPr>
+                </a:tc>
+                <a:tc>
+                  <a:txBody>
+                    <a:bodyPr/>
+                    <a:lstStyle/>
+                    <a:p>
+                      <a:pPr algn="ctr">
+                        <a:defRPr sz="1800">
+                          <a:uFillTx/>
+                        </a:defRPr>
+                      </a:pPr>
+                      <a:r>
+                        <a:rPr sz="3100">
+                          <a:uFill>
+                            <a:solidFill>
+                              <a:srgbClr val="000000"/>
+                            </a:solidFill>
+                          </a:uFill>
+                          <a:sym typeface="Helvetica"/>
+                        </a:rPr>
+                        <a:t>1</a:t>
+                      </a:r>
+                    </a:p>
+                  </a:txBody>
+                  <a:tcPr marL="0" marR="0" marT="0" marB="0" anchor="ctr" anchorCtr="0" horzOverflow="overflow">
+                    <a:lnT w="38100">
+                      <a:solidFill>
+                        <a:srgbClr val="FFFFFF"/>
+                      </a:solidFill>
+                    </a:lnT>
+                  </a:tcPr>
+                </a:tc>
+              </a:tr>
+              <a:tr h="1223367">
+                <a:tc>
+                  <a:txBody>
+                    <a:bodyPr/>
+                    <a:lstStyle/>
+                    <a:p>
+                      <a:pPr algn="ctr">
+                        <a:defRPr sz="2900">
+                          <a:sym typeface="Helvetica"/>
+                        </a:defRPr>
+                      </a:pPr>
+                      <a:r>
+                        <a:rPr b="0"/>
+                        <a:t>D36E::</a:t>
+                      </a:r>
+                      <a:r>
+                        <a:t>HopN1a </a:t>
+                      </a:r>
+                      <a:r>
+                        <a:rPr b="0"/>
+                        <a:t>vs D36E::EV</a:t>
+                      </a:r>
+                    </a:p>
+                  </a:txBody>
+                  <a:tcPr marL="0" marR="0" marT="0" marB="0" anchor="ctr" anchorCtr="0" horzOverflow="overflow">
+                    <a:solidFill>
+                      <a:srgbClr val="535353"/>
+                    </a:solidFill>
+                  </a:tcPr>
+                </a:tc>
+                <a:tc>
+                  <a:txBody>
+                    <a:bodyPr/>
+                    <a:lstStyle/>
+                    <a:p>
+                      <a:pPr algn="ctr">
+                        <a:defRPr sz="1800">
+                          <a:uFillTx/>
+                        </a:defRPr>
+                      </a:pPr>
+                      <a:r>
+                        <a:rPr sz="2900">
+                          <a:uFill>
+                            <a:solidFill>
+                              <a:srgbClr val="000000"/>
+                            </a:solidFill>
+                          </a:uFill>
+                          <a:sym typeface="Helvetica"/>
+                        </a:rPr>
+                        <a:t>8 hours</a:t>
+                      </a:r>
+                    </a:p>
+                  </a:txBody>
+                  <a:tcPr marL="0" marR="0" marT="0" marB="0" anchor="ctr" anchorCtr="0" horzOverflow="overflow"/>
+                </a:tc>
+                <a:tc>
+                  <a:txBody>
+                    <a:bodyPr/>
+                    <a:lstStyle/>
+                    <a:p>
+                      <a:pPr algn="ctr">
+                        <a:defRPr sz="1800">
+                          <a:uFillTx/>
+                        </a:defRPr>
+                      </a:pPr>
+                      <a:r>
+                        <a:rPr sz="3100">
+                          <a:uFill>
+                            <a:solidFill>
+                              <a:srgbClr val="000000"/>
+                            </a:solidFill>
+                          </a:uFill>
+                          <a:sym typeface="Helvetica"/>
+                        </a:rPr>
+                        <a:t>14</a:t>
+                      </a:r>
+                    </a:p>
+                  </a:txBody>
+                  <a:tcPr marL="0" marR="0" marT="0" marB="0" anchor="ctr" anchorCtr="0" horzOverflow="overflow"/>
+                </a:tc>
+                <a:tc>
+                  <a:txBody>
+                    <a:bodyPr/>
+                    <a:lstStyle/>
+                    <a:p>
+                      <a:pPr algn="ctr">
+                        <a:defRPr sz="1800">
+                          <a:uFillTx/>
+                        </a:defRPr>
+                      </a:pPr>
+                      <a:r>
+                        <a:rPr sz="3100">
+                          <a:uFill>
+                            <a:solidFill>
+                              <a:srgbClr val="000000"/>
+                            </a:solidFill>
+                          </a:uFill>
+                          <a:sym typeface="Helvetica"/>
+                        </a:rPr>
+                        <a:t>4</a:t>
+                      </a:r>
+                    </a:p>
+                  </a:txBody>
+                  <a:tcPr marL="0" marR="0" marT="0" marB="0" anchor="ctr" anchorCtr="0" horzOverflow="overflow"/>
+                </a:tc>
+                <a:tc>
+                  <a:txBody>
+                    <a:bodyPr/>
+                    <a:lstStyle/>
+                    <a:p>
+                      <a:pPr algn="ctr">
+                        <a:defRPr sz="1800">
+                          <a:uFillTx/>
+                        </a:defRPr>
+                      </a:pPr>
+                      <a:r>
+                        <a:rPr sz="3100">
+                          <a:uFill>
+                            <a:solidFill>
+                              <a:srgbClr val="000000"/>
+                            </a:solidFill>
+                          </a:uFill>
+                          <a:sym typeface="Helvetica"/>
+                        </a:rPr>
+                        <a:t>10</a:t>
+                      </a:r>
+                    </a:p>
+                  </a:txBody>
+                  <a:tcPr marL="0" marR="0" marT="0" marB="0" anchor="ctr" anchorCtr="0" horzOverflow="overflow"/>
+                </a:tc>
+              </a:tr>
+              <a:tr h="1185366">
+                <a:tc>
+                  <a:txBody>
+                    <a:bodyPr/>
+                    <a:lstStyle/>
+                    <a:p>
+                      <a:pPr algn="ctr">
+                        <a:defRPr sz="2900">
+                          <a:sym typeface="Helvetica"/>
+                        </a:defRPr>
+                      </a:pPr>
+                      <a:r>
+                        <a:rPr b="0"/>
+                        <a:t>D36E::</a:t>
+                      </a:r>
+                      <a:r>
+                        <a:t>HopB1a </a:t>
+                      </a:r>
+                      <a:r>
+                        <a:rPr b="0"/>
+                        <a:t>vs D36E::EV</a:t>
+                      </a:r>
+                    </a:p>
+                  </a:txBody>
+                  <a:tcPr marL="0" marR="0" marT="0" marB="0" anchor="ctr" anchorCtr="0" horzOverflow="overflow">
+                    <a:solidFill>
+                      <a:srgbClr val="535353"/>
+                    </a:solidFill>
+                  </a:tcPr>
+                </a:tc>
+                <a:tc>
+                  <a:txBody>
+                    <a:bodyPr/>
+                    <a:lstStyle/>
+                    <a:p>
+                      <a:pPr algn="ctr">
+                        <a:defRPr sz="1800">
+                          <a:uFillTx/>
+                        </a:defRPr>
+                      </a:pPr>
+                      <a:r>
+                        <a:rPr sz="2900">
+                          <a:uFill>
+                            <a:solidFill>
+                              <a:srgbClr val="000000"/>
+                            </a:solidFill>
+                          </a:uFill>
+                          <a:sym typeface="Helvetica"/>
+                        </a:rPr>
+                        <a:t>1 hour
+</a:t>
+                      </a:r>
+                    </a:p>
+                  </a:txBody>
+                  <a:tcPr marL="0" marR="0" marT="0" marB="0" anchor="ctr" anchorCtr="0" horzOverflow="overflow"/>
+                </a:tc>
+                <a:tc>
+                  <a:txBody>
+                    <a:bodyPr/>
+                    <a:lstStyle/>
+                    <a:p>
+                      <a:pPr algn="ctr">
+                        <a:defRPr sz="1800">
+                          <a:uFillTx/>
+                        </a:defRPr>
+                      </a:pPr>
+                      <a:r>
+                        <a:rPr sz="3100">
+                          <a:uFill>
+                            <a:solidFill>
+                              <a:srgbClr val="000000"/>
+                            </a:solidFill>
+                          </a:uFill>
+                          <a:sym typeface="Helvetica"/>
+                        </a:rPr>
+                        <a:t>1</a:t>
+                      </a:r>
+                    </a:p>
+                  </a:txBody>
+                  <a:tcPr marL="0" marR="0" marT="0" marB="0" anchor="ctr" anchorCtr="0" horzOverflow="overflow"/>
+                </a:tc>
+                <a:tc>
+                  <a:txBody>
+                    <a:bodyPr/>
+                    <a:lstStyle/>
+                    <a:p>
+                      <a:pPr algn="ctr">
+                        <a:defRPr sz="1800">
+                          <a:uFillTx/>
+                        </a:defRPr>
+                      </a:pPr>
+                      <a:r>
+                        <a:rPr sz="3100">
+                          <a:uFill>
+                            <a:solidFill>
+                              <a:srgbClr val="000000"/>
+                            </a:solidFill>
+                          </a:uFill>
+                          <a:sym typeface="Helvetica"/>
+                        </a:rPr>
+                        <a:t>1</a:t>
+                      </a:r>
+                    </a:p>
+                  </a:txBody>
+                  <a:tcPr marL="0" marR="0" marT="0" marB="0" anchor="ctr" anchorCtr="0" horzOverflow="overflow"/>
+                </a:tc>
+                <a:tc>
+                  <a:txBody>
+                    <a:bodyPr/>
+                    <a:lstStyle/>
+                    <a:p>
+                      <a:pPr algn="ctr">
+                        <a:defRPr sz="1800">
+                          <a:uFillTx/>
+                        </a:defRPr>
+                      </a:pPr>
+                      <a:r>
+                        <a:rPr sz="3100">
+                          <a:uFill>
+                            <a:solidFill>
+                              <a:srgbClr val="000000"/>
+                            </a:solidFill>
+                          </a:uFill>
+                          <a:sym typeface="Helvetica"/>
+                        </a:rPr>
+                        <a:t>0</a:t>
+                      </a:r>
+                    </a:p>
+                  </a:txBody>
+                  <a:tcPr marL="0" marR="0" marT="0" marB="0" anchor="ctr" anchorCtr="0" horzOverflow="overflow"/>
+                </a:tc>
+              </a:tr>
+              <a:tr h="1238250">
+                <a:tc>
+                  <a:txBody>
+                    <a:bodyPr/>
+                    <a:lstStyle/>
+                    <a:p>
+                      <a:pPr algn="ctr">
+                        <a:defRPr sz="2900">
+                          <a:sym typeface="Helvetica"/>
+                        </a:defRPr>
+                      </a:pPr>
+                      <a:r>
+                        <a:rPr b="0"/>
+                        <a:t>D36E::</a:t>
+                      </a:r>
+                      <a:r>
+                        <a:t>HopB1a </a:t>
+                      </a:r>
+                      <a:r>
+                        <a:rPr b="0"/>
+                        <a:t>vs D36E::EV</a:t>
+                      </a:r>
+                    </a:p>
+                  </a:txBody>
+                  <a:tcPr marL="0" marR="0" marT="0" marB="0" anchor="ctr" anchorCtr="0" horzOverflow="overflow">
+                    <a:solidFill>
+                      <a:srgbClr val="535353"/>
+                    </a:solidFill>
+                  </a:tcPr>
+                </a:tc>
+                <a:tc>
+                  <a:txBody>
+                    <a:bodyPr/>
+                    <a:lstStyle/>
+                    <a:p>
+                      <a:pPr algn="ctr">
+                        <a:defRPr sz="1800">
+                          <a:uFillTx/>
+                        </a:defRPr>
+                      </a:pPr>
+                      <a:r>
+                        <a:rPr sz="2900">
+                          <a:uFill>
+                            <a:solidFill>
+                              <a:srgbClr val="000000"/>
+                            </a:solidFill>
+                          </a:uFill>
+                          <a:sym typeface="Helvetica"/>
+                        </a:rPr>
+                        <a:t>8 hours</a:t>
+                      </a:r>
+                    </a:p>
+                  </a:txBody>
+                  <a:tcPr marL="0" marR="0" marT="0" marB="0" anchor="ctr" anchorCtr="0" horzOverflow="overflow"/>
+                </a:tc>
+                <a:tc>
+                  <a:txBody>
+                    <a:bodyPr/>
+                    <a:lstStyle/>
+                    <a:p>
+                      <a:pPr algn="ctr">
+                        <a:defRPr sz="1800">
+                          <a:uFillTx/>
+                        </a:defRPr>
+                      </a:pPr>
+                      <a:r>
+                        <a:rPr sz="3100">
+                          <a:uFill>
+                            <a:solidFill>
+                              <a:srgbClr val="000000"/>
+                            </a:solidFill>
+                          </a:uFill>
+                          <a:sym typeface="Helvetica"/>
+                        </a:rPr>
+                        <a:t>960</a:t>
+                      </a:r>
+                    </a:p>
+                  </a:txBody>
+                  <a:tcPr marL="0" marR="0" marT="0" marB="0" anchor="ctr" anchorCtr="0" horzOverflow="overflow"/>
+                </a:tc>
+                <a:tc>
+                  <a:txBody>
+                    <a:bodyPr/>
+                    <a:lstStyle/>
+                    <a:p>
+                      <a:pPr algn="ctr">
+                        <a:defRPr sz="1800">
+                          <a:uFillTx/>
+                        </a:defRPr>
+                      </a:pPr>
+                      <a:r>
+                        <a:rPr sz="3100">
+                          <a:uFill>
+                            <a:solidFill>
+                              <a:srgbClr val="000000"/>
+                            </a:solidFill>
+                          </a:uFill>
+                          <a:sym typeface="Helvetica"/>
+                        </a:rPr>
+                        <a:t>659</a:t>
+                      </a:r>
+                    </a:p>
+                  </a:txBody>
+                  <a:tcPr marL="0" marR="0" marT="0" marB="0" anchor="ctr" anchorCtr="0" horzOverflow="overflow"/>
+                </a:tc>
+                <a:tc>
+                  <a:txBody>
+                    <a:bodyPr/>
+                    <a:lstStyle/>
+                    <a:p>
+                      <a:pPr algn="ctr">
+                        <a:defRPr sz="1800">
+                          <a:uFillTx/>
+                        </a:defRPr>
+                      </a:pPr>
+                      <a:r>
+                        <a:rPr sz="3100">
+                          <a:uFill>
+                            <a:solidFill>
+                              <a:srgbClr val="000000"/>
+                            </a:solidFill>
+                          </a:uFill>
+                          <a:sym typeface="Helvetica"/>
+                        </a:rPr>
+                        <a:t>301</a:t>
+                      </a:r>
+                    </a:p>
+                  </a:txBody>
+                  <a:tcPr marL="0" marR="0" marT="0" marB="0" anchor="ctr" anchorCtr="0" horzOverflow="overflow"/>
+                </a:tc>
+              </a:tr>
+              <a:tr h="1179314">
+                <a:tc>
+                  <a:txBody>
+                    <a:bodyPr/>
+                    <a:lstStyle/>
+                    <a:p>
+                      <a:pPr algn="ctr">
+                        <a:defRPr sz="2900">
+                          <a:sym typeface="Helvetica"/>
+                        </a:defRPr>
+                      </a:pPr>
+                      <a:r>
+                        <a:rPr b="0"/>
+                        <a:t>D36E::</a:t>
+                      </a:r>
+                      <a:r>
+                        <a:t>HopAB1j </a:t>
+                      </a:r>
+                      <a:r>
+                        <a:rPr b="0"/>
+                        <a:t>vs D36E::EV</a:t>
+                      </a:r>
+                    </a:p>
+                  </a:txBody>
+                  <a:tcPr marL="0" marR="0" marT="0" marB="0" anchor="ctr" anchorCtr="0" horzOverflow="overflow">
+                    <a:solidFill>
+                      <a:srgbClr val="535353"/>
+                    </a:solidFill>
+                  </a:tcPr>
+                </a:tc>
+                <a:tc>
+                  <a:txBody>
+                    <a:bodyPr/>
+                    <a:lstStyle/>
+                    <a:p>
+                      <a:pPr algn="ctr">
+                        <a:defRPr sz="1800">
+                          <a:uFillTx/>
+                        </a:defRPr>
+                      </a:pPr>
+                      <a:r>
+                        <a:rPr sz="2900">
+                          <a:uFill>
+                            <a:solidFill>
+                              <a:srgbClr val="000000"/>
+                            </a:solidFill>
+                          </a:uFill>
+                          <a:sym typeface="Helvetica"/>
+                        </a:rPr>
+                        <a:t>1 hour
+</a:t>
+                      </a:r>
+                    </a:p>
+                  </a:txBody>
+                  <a:tcPr marL="0" marR="0" marT="0" marB="0" anchor="ctr" anchorCtr="0" horzOverflow="overflow"/>
+                </a:tc>
+                <a:tc>
+                  <a:txBody>
+                    <a:bodyPr/>
+                    <a:lstStyle/>
+                    <a:p>
+                      <a:pPr algn="ctr">
+                        <a:defRPr sz="1800">
+                          <a:uFillTx/>
+                        </a:defRPr>
+                      </a:pPr>
+                      <a:r>
+                        <a:rPr sz="3100">
+                          <a:uFill>
+                            <a:solidFill>
+                              <a:srgbClr val="000000"/>
+                            </a:solidFill>
+                          </a:uFill>
+                          <a:sym typeface="Helvetica"/>
+                        </a:rPr>
+                        <a:t>5</a:t>
+                      </a:r>
+                    </a:p>
+                  </a:txBody>
+                  <a:tcPr marL="0" marR="0" marT="0" marB="0" anchor="ctr" anchorCtr="0" horzOverflow="overflow"/>
+                </a:tc>
+                <a:tc>
+                  <a:txBody>
+                    <a:bodyPr/>
+                    <a:lstStyle/>
+                    <a:p>
+                      <a:pPr algn="ctr">
+                        <a:defRPr sz="1800">
+                          <a:uFillTx/>
+                        </a:defRPr>
+                      </a:pPr>
+                      <a:r>
+                        <a:rPr sz="3100">
+                          <a:uFill>
+                            <a:solidFill>
+                              <a:srgbClr val="000000"/>
+                            </a:solidFill>
+                          </a:uFill>
+                          <a:sym typeface="Helvetica"/>
+                        </a:rPr>
+                        <a:t>4</a:t>
+                      </a:r>
+                    </a:p>
+                  </a:txBody>
+                  <a:tcPr marL="0" marR="0" marT="0" marB="0" anchor="ctr" anchorCtr="0" horzOverflow="overflow"/>
+                </a:tc>
+                <a:tc>
+                  <a:txBody>
+                    <a:bodyPr/>
+                    <a:lstStyle/>
+                    <a:p>
+                      <a:pPr algn="ctr">
+                        <a:defRPr sz="1800">
+                          <a:uFillTx/>
+                        </a:defRPr>
+                      </a:pPr>
+                      <a:r>
+                        <a:rPr sz="3100">
+                          <a:uFill>
+                            <a:solidFill>
+                              <a:srgbClr val="000000"/>
+                            </a:solidFill>
+                          </a:uFill>
+                          <a:sym typeface="Helvetica"/>
+                        </a:rPr>
+                        <a:t>1</a:t>
+                      </a:r>
+                    </a:p>
+                  </a:txBody>
+                  <a:tcPr marL="0" marR="0" marT="0" marB="0" anchor="ctr" anchorCtr="0" horzOverflow="overflow"/>
+                </a:tc>
+              </a:tr>
+              <a:tr h="1165621">
+                <a:tc>
+                  <a:txBody>
+                    <a:bodyPr/>
+                    <a:lstStyle/>
+                    <a:p>
+                      <a:pPr algn="ctr">
+                        <a:defRPr sz="2900">
+                          <a:sym typeface="Helvetica"/>
+                        </a:defRPr>
+                      </a:pPr>
+                      <a:r>
+                        <a:rPr b="0"/>
+                        <a:t>D36E::</a:t>
+                      </a:r>
+                      <a:r>
+                        <a:t>HopABj </a:t>
+                      </a:r>
+                      <a:r>
+                        <a:rPr b="0"/>
+                        <a:t>vs D36E::EV</a:t>
+                      </a:r>
+                    </a:p>
+                  </a:txBody>
+                  <a:tcPr marL="0" marR="0" marT="0" marB="0" anchor="ctr" anchorCtr="0" horzOverflow="overflow">
+                    <a:solidFill>
+                      <a:srgbClr val="535353"/>
+                    </a:solidFill>
+                  </a:tcPr>
+                </a:tc>
+                <a:tc>
+                  <a:txBody>
+                    <a:bodyPr/>
+                    <a:lstStyle/>
+                    <a:p>
+                      <a:pPr algn="ctr">
+                        <a:defRPr sz="1800">
+                          <a:uFillTx/>
+                        </a:defRPr>
+                      </a:pPr>
+                      <a:r>
+                        <a:rPr sz="2900">
+                          <a:uFill>
+                            <a:solidFill>
+                              <a:srgbClr val="000000"/>
+                            </a:solidFill>
+                          </a:uFill>
+                          <a:sym typeface="Helvetica"/>
+                        </a:rPr>
+                        <a:t>8 hours</a:t>
+                      </a:r>
+                    </a:p>
+                  </a:txBody>
+                  <a:tcPr marL="0" marR="0" marT="0" marB="0" anchor="ctr" anchorCtr="0" horzOverflow="overflow"/>
+                </a:tc>
+                <a:tc>
+                  <a:txBody>
+                    <a:bodyPr/>
+                    <a:lstStyle/>
+                    <a:p>
+                      <a:pPr algn="ctr">
+                        <a:defRPr sz="1800">
+                          <a:uFillTx/>
+                        </a:defRPr>
+                      </a:pPr>
+                      <a:r>
+                        <a:rPr sz="3100">
+                          <a:uFill>
+                            <a:solidFill>
+                              <a:srgbClr val="000000"/>
+                            </a:solidFill>
+                          </a:uFill>
+                          <a:sym typeface="Helvetica"/>
+                        </a:rPr>
+                        <a:t>543</a:t>
+                      </a:r>
+                    </a:p>
+                  </a:txBody>
+                  <a:tcPr marL="0" marR="0" marT="0" marB="0" anchor="ctr" anchorCtr="0" horzOverflow="overflow"/>
+                </a:tc>
+                <a:tc>
+                  <a:txBody>
+                    <a:bodyPr/>
+                    <a:lstStyle/>
+                    <a:p>
+                      <a:pPr algn="ctr">
+                        <a:defRPr sz="1800">
+                          <a:uFillTx/>
+                        </a:defRPr>
+                      </a:pPr>
+                      <a:r>
+                        <a:rPr sz="3100">
+                          <a:uFill>
+                            <a:solidFill>
+                              <a:srgbClr val="000000"/>
+                            </a:solidFill>
+                          </a:uFill>
+                          <a:sym typeface="Helvetica"/>
+                        </a:rPr>
+                        <a:t>474</a:t>
+                      </a:r>
+                    </a:p>
+                  </a:txBody>
+                  <a:tcPr marL="0" marR="0" marT="0" marB="0" anchor="ctr" anchorCtr="0" horzOverflow="overflow"/>
+                </a:tc>
+                <a:tc>
+                  <a:txBody>
+                    <a:bodyPr/>
+                    <a:lstStyle/>
+                    <a:p>
+                      <a:pPr algn="ctr">
+                        <a:defRPr sz="1800">
+                          <a:uFillTx/>
+                        </a:defRPr>
+                      </a:pPr>
+                      <a:r>
+                        <a:rPr sz="3100">
+                          <a:uFill>
+                            <a:solidFill>
+                              <a:srgbClr val="000000"/>
+                            </a:solidFill>
+                          </a:uFill>
+                          <a:sym typeface="Helvetica"/>
+                        </a:rPr>
+                        <a:t>69</a:t>
+                      </a:r>
+                    </a:p>
+                  </a:txBody>
+                  <a:tcPr marL="0" marR="0" marT="0" marB="0" anchor="ctr" anchorCtr="0" horzOverflow="overflow"/>
+                </a:tc>
+              </a:tr>
+            </a:tbl>
+          </a:graphicData>
+        </a:graphic>
+      </p:graphicFrame>
     </p:spTree>
   </p:cSld>
   <p:clrMapOvr>

</xml_diff>